<commit_message>
Add two figures to presentation.pptx
</commit_message>
<xml_diff>
--- a/presentation.pptx
+++ b/presentation.pptx
@@ -6,6 +6,8 @@
   </p:sldMasterIdLst>
   <p:sldIdLst>
     <p:sldId id="256" r:id="rId2"/>
+    <p:sldId id="257" r:id="rId3"/>
+    <p:sldId id="258" r:id="rId4"/>
   </p:sldIdLst>
   <p:sldSz cx="12192000" cy="6858000"/>
   <p:notesSz cx="6858000" cy="9144000"/>
@@ -104,7 +106,2219 @@
       </a:defRPr>
     </a:lvl9pPr>
   </p:defaultTextStyle>
+  <p:extLst>
+    <p:ext uri="{EFAFB233-063F-42B5-8137-9DF3F51BA10A}">
+      <p15:sldGuideLst xmlns:p15="http://schemas.microsoft.com/office/powerpoint/2012/main"/>
+    </p:ext>
+  </p:extLst>
 </p:presentation>
+</file>
+
+<file path=ppt/charts/chart1.xml><?xml version="1.0" encoding="utf-8"?>
+<c:chartSpace xmlns:c="http://schemas.openxmlformats.org/drawingml/2006/chart" xmlns:a="http://schemas.openxmlformats.org/drawingml/2006/main" xmlns:r="http://schemas.openxmlformats.org/officeDocument/2006/relationships" xmlns:c16r2="http://schemas.microsoft.com/office/drawing/2015/06/chart">
+  <c:date1904 val="0"/>
+  <c:lang val="ja-JP"/>
+  <c:roundedCorners val="0"/>
+  <mc:AlternateContent xmlns:mc="http://schemas.openxmlformats.org/markup-compatibility/2006">
+    <mc:Choice xmlns:c14="http://schemas.microsoft.com/office/drawing/2007/8/2/chart" Requires="c14">
+      <c14:style val="102"/>
+    </mc:Choice>
+    <mc:Fallback>
+      <c:style val="2"/>
+    </mc:Fallback>
+  </mc:AlternateContent>
+  <c:chart>
+    <c:title>
+      <c:tx>
+        <c:rich>
+          <a:bodyPr rot="0" spcFirstLastPara="1" vertOverflow="ellipsis" vert="horz" wrap="square" anchor="ctr" anchorCtr="1"/>
+          <a:lstStyle/>
+          <a:p>
+            <a:pPr>
+              <a:defRPr lang="ja-JP" sz="1400" b="0" i="0" u="none" strike="noStrike" kern="1200" spc="0" baseline="0">
+                <a:solidFill>
+                  <a:schemeClr val="tx1">
+                    <a:lumMod val="65000"/>
+                    <a:lumOff val="35000"/>
+                  </a:schemeClr>
+                </a:solidFill>
+                <a:latin typeface="+mn-lt"/>
+                <a:ea typeface="+mn-ea"/>
+                <a:cs typeface="+mn-cs"/>
+              </a:defRPr>
+            </a:pPr>
+            <a:r>
+              <a:rPr lang="en-US" altLang="ja-JP" dirty="0"/>
+              <a:t>Figure 01</a:t>
+            </a:r>
+            <a:br>
+              <a:rPr lang="en-US" altLang="ja-JP" dirty="0"/>
+            </a:br>
+            <a:r>
+              <a:rPr lang="en-US" altLang="ja-JP" dirty="0"/>
+              <a:t>Manufacturing</a:t>
+            </a:r>
+            <a:r>
+              <a:rPr lang="en-US" altLang="ja-JP" baseline="0" dirty="0"/>
+              <a:t> Shipments of 2014</a:t>
+            </a:r>
+            <a:endParaRPr lang="ja-JP" altLang="en-US"/>
+          </a:p>
+        </c:rich>
+      </c:tx>
+      <c:layout>
+        <c:manualLayout>
+          <c:xMode val="edge"/>
+          <c:yMode val="edge"/>
+          <c:x val="0.23833357450448486"/>
+          <c:y val="0"/>
+        </c:manualLayout>
+      </c:layout>
+      <c:overlay val="0"/>
+      <c:spPr>
+        <a:noFill/>
+        <a:ln>
+          <a:noFill/>
+        </a:ln>
+        <a:effectLst/>
+      </c:spPr>
+      <c:txPr>
+        <a:bodyPr rot="0" spcFirstLastPara="1" vertOverflow="ellipsis" vert="horz" wrap="square" anchor="ctr" anchorCtr="1"/>
+        <a:lstStyle/>
+        <a:p>
+          <a:pPr>
+            <a:defRPr lang="ja-JP" sz="1400" b="0" i="0" u="none" strike="noStrike" kern="1200" spc="0" baseline="0">
+              <a:solidFill>
+                <a:schemeClr val="tx1">
+                  <a:lumMod val="65000"/>
+                  <a:lumOff val="35000"/>
+                </a:schemeClr>
+              </a:solidFill>
+              <a:latin typeface="+mn-lt"/>
+              <a:ea typeface="+mn-ea"/>
+              <a:cs typeface="+mn-cs"/>
+            </a:defRPr>
+          </a:pPr>
+          <a:endParaRPr lang="ja-JP"/>
+        </a:p>
+      </c:txPr>
+    </c:title>
+    <c:autoTitleDeleted val="0"/>
+    <c:plotArea>
+      <c:layout/>
+      <c:pieChart>
+        <c:varyColors val="1"/>
+        <c:ser>
+          <c:idx val="0"/>
+          <c:order val="0"/>
+          <c:dPt>
+            <c:idx val="0"/>
+            <c:bubble3D val="0"/>
+            <c:spPr>
+              <a:solidFill>
+                <a:schemeClr val="accent1"/>
+              </a:solidFill>
+              <a:ln w="19050">
+                <a:solidFill>
+                  <a:schemeClr val="lt1"/>
+                </a:solidFill>
+              </a:ln>
+              <a:effectLst/>
+            </c:spPr>
+            <c:extLst>
+              <c:ext xmlns:c16="http://schemas.microsoft.com/office/drawing/2014/chart" uri="{C3380CC4-5D6E-409C-BE32-E72D297353CC}">
+                <c16:uniqueId val="{00000001-659B-B74D-BFD9-CA82DB9F7F94}"/>
+              </c:ext>
+            </c:extLst>
+          </c:dPt>
+          <c:dPt>
+            <c:idx val="1"/>
+            <c:bubble3D val="0"/>
+            <c:spPr>
+              <a:solidFill>
+                <a:schemeClr val="accent2"/>
+              </a:solidFill>
+              <a:ln w="19050">
+                <a:solidFill>
+                  <a:schemeClr val="lt1"/>
+                </a:solidFill>
+              </a:ln>
+              <a:effectLst/>
+            </c:spPr>
+            <c:extLst>
+              <c:ext xmlns:c16="http://schemas.microsoft.com/office/drawing/2014/chart" uri="{C3380CC4-5D6E-409C-BE32-E72D297353CC}">
+                <c16:uniqueId val="{00000003-659B-B74D-BFD9-CA82DB9F7F94}"/>
+              </c:ext>
+            </c:extLst>
+          </c:dPt>
+          <c:dPt>
+            <c:idx val="2"/>
+            <c:bubble3D val="0"/>
+            <c:spPr>
+              <a:solidFill>
+                <a:schemeClr val="accent3"/>
+              </a:solidFill>
+              <a:ln w="19050">
+                <a:solidFill>
+                  <a:schemeClr val="lt1"/>
+                </a:solidFill>
+              </a:ln>
+              <a:effectLst/>
+            </c:spPr>
+            <c:extLst>
+              <c:ext xmlns:c16="http://schemas.microsoft.com/office/drawing/2014/chart" uri="{C3380CC4-5D6E-409C-BE32-E72D297353CC}">
+                <c16:uniqueId val="{00000005-659B-B74D-BFD9-CA82DB9F7F94}"/>
+              </c:ext>
+            </c:extLst>
+          </c:dPt>
+          <c:dPt>
+            <c:idx val="3"/>
+            <c:bubble3D val="0"/>
+            <c:spPr>
+              <a:solidFill>
+                <a:schemeClr val="accent4"/>
+              </a:solidFill>
+              <a:ln w="19050">
+                <a:solidFill>
+                  <a:schemeClr val="lt1"/>
+                </a:solidFill>
+              </a:ln>
+              <a:effectLst/>
+            </c:spPr>
+            <c:extLst>
+              <c:ext xmlns:c16="http://schemas.microsoft.com/office/drawing/2014/chart" uri="{C3380CC4-5D6E-409C-BE32-E72D297353CC}">
+                <c16:uniqueId val="{00000007-659B-B74D-BFD9-CA82DB9F7F94}"/>
+              </c:ext>
+            </c:extLst>
+          </c:dPt>
+          <c:dLbls>
+            <c:dLbl>
+              <c:idx val="2"/>
+              <c:spPr>
+                <a:noFill/>
+                <a:ln>
+                  <a:noFill/>
+                </a:ln>
+                <a:effectLst/>
+              </c:spPr>
+              <c:txPr>
+                <a:bodyPr rot="0" spcFirstLastPara="1" vertOverflow="ellipsis" vert="horz" wrap="square" lIns="38100" tIns="19050" rIns="38100" bIns="19050" anchor="ctr" anchorCtr="1">
+                  <a:spAutoFit/>
+                </a:bodyPr>
+                <a:lstStyle/>
+                <a:p>
+                  <a:pPr>
+                    <a:defRPr sz="1100" b="0" i="0" u="none" strike="noStrike" kern="1200" baseline="0">
+                      <a:ln w="3175">
+                        <a:noFill/>
+                      </a:ln>
+                      <a:solidFill>
+                        <a:schemeClr val="tx1"/>
+                      </a:solidFill>
+                      <a:latin typeface="+mn-lt"/>
+                      <a:ea typeface="+mn-ea"/>
+                      <a:cs typeface="+mn-cs"/>
+                    </a:defRPr>
+                  </a:pPr>
+                  <a:endParaRPr lang="ja-JP"/>
+                </a:p>
+              </c:txPr>
+              <c:dLblPos val="bestFit"/>
+              <c:showLegendKey val="0"/>
+              <c:showVal val="0"/>
+              <c:showCatName val="1"/>
+              <c:showSerName val="0"/>
+              <c:showPercent val="1"/>
+              <c:showBubbleSize val="0"/>
+              <c:extLst>
+                <c:ext xmlns:c16="http://schemas.microsoft.com/office/drawing/2014/chart" uri="{C3380CC4-5D6E-409C-BE32-E72D297353CC}">
+                  <c16:uniqueId val="{00000005-659B-B74D-BFD9-CA82DB9F7F94}"/>
+                </c:ext>
+              </c:extLst>
+            </c:dLbl>
+            <c:spPr>
+              <a:noFill/>
+              <a:ln>
+                <a:noFill/>
+              </a:ln>
+              <a:effectLst/>
+            </c:spPr>
+            <c:txPr>
+              <a:bodyPr rot="0" spcFirstLastPara="1" vertOverflow="ellipsis" vert="horz" wrap="square" lIns="38100" tIns="19050" rIns="38100" bIns="19050" anchor="ctr" anchorCtr="1">
+                <a:spAutoFit/>
+              </a:bodyPr>
+              <a:lstStyle/>
+              <a:p>
+                <a:pPr>
+                  <a:defRPr sz="1100" b="0" i="0" u="none" strike="noStrike" kern="1200" baseline="0">
+                    <a:ln w="3175">
+                      <a:solidFill>
+                        <a:schemeClr val="bg1"/>
+                      </a:solidFill>
+                    </a:ln>
+                    <a:solidFill>
+                      <a:schemeClr val="tx1">
+                        <a:lumMod val="75000"/>
+                        <a:lumOff val="25000"/>
+                      </a:schemeClr>
+                    </a:solidFill>
+                    <a:latin typeface="+mn-lt"/>
+                    <a:ea typeface="+mn-ea"/>
+                    <a:cs typeface="+mn-cs"/>
+                  </a:defRPr>
+                </a:pPr>
+                <a:endParaRPr lang="ja-JP"/>
+              </a:p>
+            </c:txPr>
+            <c:dLblPos val="bestFit"/>
+            <c:showLegendKey val="0"/>
+            <c:showVal val="0"/>
+            <c:showCatName val="1"/>
+            <c:showSerName val="0"/>
+            <c:showPercent val="1"/>
+            <c:showBubbleSize val="0"/>
+            <c:showLeaderLines val="1"/>
+            <c:leaderLines>
+              <c:spPr>
+                <a:ln w="9525" cap="flat" cmpd="sng" algn="ctr">
+                  <a:solidFill>
+                    <a:schemeClr val="tx1">
+                      <a:lumMod val="35000"/>
+                      <a:lumOff val="65000"/>
+                    </a:schemeClr>
+                  </a:solidFill>
+                  <a:round/>
+                </a:ln>
+                <a:effectLst/>
+              </c:spPr>
+            </c:leaderLines>
+            <c:extLst>
+              <c:ext xmlns:c15="http://schemas.microsoft.com/office/drawing/2012/chart" uri="{CE6537A1-D6FC-4f65-9D91-7224C49458BB}"/>
+            </c:extLst>
+          </c:dLbls>
+          <c:cat>
+            <c:strRef>
+              <c:f>Sheet1!$A$3:$A$6</c:f>
+              <c:strCache>
+                <c:ptCount val="4"/>
+                <c:pt idx="0">
+                  <c:v>Chemical and allied products</c:v>
+                </c:pt>
+                <c:pt idx="1">
+                  <c:v>Production machinery</c:v>
+                </c:pt>
+                <c:pt idx="2">
+                  <c:v>Ceramic, stone and clay products</c:v>
+                </c:pt>
+                <c:pt idx="3">
+                  <c:v>Others</c:v>
+                </c:pt>
+              </c:strCache>
+            </c:strRef>
+          </c:cat>
+          <c:val>
+            <c:numRef>
+              <c:f>Sheet1!$B$3:$B$6</c:f>
+              <c:numCache>
+                <c:formatCode>General</c:formatCode>
+                <c:ptCount val="4"/>
+                <c:pt idx="0">
+                  <c:v>31907805</c:v>
+                </c:pt>
+                <c:pt idx="1">
+                  <c:v>4727355</c:v>
+                </c:pt>
+                <c:pt idx="2">
+                  <c:v>3618649</c:v>
+                </c:pt>
+                <c:pt idx="3">
+                  <c:v>7597987</c:v>
+                </c:pt>
+              </c:numCache>
+            </c:numRef>
+          </c:val>
+          <c:extLst>
+            <c:ext xmlns:c16="http://schemas.microsoft.com/office/drawing/2014/chart" uri="{C3380CC4-5D6E-409C-BE32-E72D297353CC}">
+              <c16:uniqueId val="{00000008-659B-B74D-BFD9-CA82DB9F7F94}"/>
+            </c:ext>
+          </c:extLst>
+        </c:ser>
+        <c:dLbls>
+          <c:showLegendKey val="0"/>
+          <c:showVal val="0"/>
+          <c:showCatName val="0"/>
+          <c:showSerName val="0"/>
+          <c:showPercent val="0"/>
+          <c:showBubbleSize val="0"/>
+          <c:showLeaderLines val="1"/>
+        </c:dLbls>
+        <c:firstSliceAng val="0"/>
+      </c:pieChart>
+      <c:spPr>
+        <a:noFill/>
+        <a:ln>
+          <a:noFill/>
+        </a:ln>
+        <a:effectLst/>
+      </c:spPr>
+    </c:plotArea>
+    <c:plotVisOnly val="1"/>
+    <c:dispBlanksAs val="gap"/>
+    <c:extLst>
+      <c:ext xmlns:c16r3="http://schemas.microsoft.com/office/drawing/2017/03/chart" uri="{56B9EC1D-385E-4148-901F-78D8002777C0}">
+        <c16r3:dataDisplayOptions16>
+          <c16r3:dispNaAsBlank val="1"/>
+        </c16r3:dataDisplayOptions16>
+      </c:ext>
+    </c:extLst>
+    <c:showDLblsOverMax val="0"/>
+  </c:chart>
+  <c:spPr>
+    <a:noFill/>
+    <a:ln>
+      <a:noFill/>
+    </a:ln>
+    <a:effectLst/>
+  </c:spPr>
+  <c:txPr>
+    <a:bodyPr/>
+    <a:lstStyle/>
+    <a:p>
+      <a:pPr>
+        <a:defRPr/>
+      </a:pPr>
+      <a:endParaRPr lang="ja-JP"/>
+    </a:p>
+  </c:txPr>
+  <c:externalData r:id="rId3">
+    <c:autoUpdate val="0"/>
+  </c:externalData>
+  <c:userShapes r:id="rId4"/>
+</c:chartSpace>
+</file>
+
+<file path=ppt/charts/chart2.xml><?xml version="1.0" encoding="utf-8"?>
+<c:chartSpace xmlns:c="http://schemas.openxmlformats.org/drawingml/2006/chart" xmlns:a="http://schemas.openxmlformats.org/drawingml/2006/main" xmlns:r="http://schemas.openxmlformats.org/officeDocument/2006/relationships" xmlns:c16r2="http://schemas.microsoft.com/office/drawing/2015/06/chart">
+  <c:date1904 val="0"/>
+  <c:lang val="ja-JP"/>
+  <c:roundedCorners val="0"/>
+  <mc:AlternateContent xmlns:mc="http://schemas.openxmlformats.org/markup-compatibility/2006">
+    <mc:Choice xmlns:c14="http://schemas.microsoft.com/office/drawing/2007/8/2/chart" Requires="c14">
+      <c14:style val="102"/>
+    </mc:Choice>
+    <mc:Fallback>
+      <c:style val="2"/>
+    </mc:Fallback>
+  </mc:AlternateContent>
+  <c:chart>
+    <c:title>
+      <c:tx>
+        <c:rich>
+          <a:bodyPr rot="0" spcFirstLastPara="1" vertOverflow="ellipsis" vert="horz" wrap="square" anchor="ctr" anchorCtr="1"/>
+          <a:lstStyle/>
+          <a:p>
+            <a:pPr>
+              <a:defRPr lang="ja-JP" sz="1400" b="0" i="0" u="none" strike="noStrike" kern="1200" spc="0" baseline="0">
+                <a:solidFill>
+                  <a:schemeClr val="tx1">
+                    <a:lumMod val="65000"/>
+                    <a:lumOff val="35000"/>
+                  </a:schemeClr>
+                </a:solidFill>
+                <a:latin typeface="+mn-lt"/>
+                <a:ea typeface="+mn-ea"/>
+                <a:cs typeface="+mn-cs"/>
+              </a:defRPr>
+            </a:pPr>
+            <a:r>
+              <a:rPr lang="en-US" altLang="ja-JP" dirty="0"/>
+              <a:t>Figure 02</a:t>
+            </a:r>
+            <a:endParaRPr lang="en-US" altLang="ja-JP" baseline="0" dirty="0"/>
+          </a:p>
+          <a:p>
+            <a:pPr>
+              <a:defRPr lang="ja-JP"/>
+            </a:pPr>
+            <a:r>
+              <a:rPr lang="en-US" altLang="ja-JP" dirty="0"/>
+              <a:t>Comparison</a:t>
+            </a:r>
+            <a:r>
+              <a:rPr lang="en-US" altLang="ja-JP" baseline="0" dirty="0"/>
+              <a:t> of Manufacturing Shipments of 2014</a:t>
+            </a:r>
+          </a:p>
+        </c:rich>
+      </c:tx>
+      <c:layout>
+        <c:manualLayout>
+          <c:xMode val="edge"/>
+          <c:yMode val="edge"/>
+          <c:x val="0.12443552212943747"/>
+          <c:y val="0"/>
+        </c:manualLayout>
+      </c:layout>
+      <c:overlay val="0"/>
+      <c:spPr>
+        <a:noFill/>
+        <a:ln>
+          <a:noFill/>
+        </a:ln>
+        <a:effectLst/>
+      </c:spPr>
+      <c:txPr>
+        <a:bodyPr rot="0" spcFirstLastPara="1" vertOverflow="ellipsis" vert="horz" wrap="square" anchor="ctr" anchorCtr="1"/>
+        <a:lstStyle/>
+        <a:p>
+          <a:pPr>
+            <a:defRPr lang="ja-JP" sz="1400" b="0" i="0" u="none" strike="noStrike" kern="1200" spc="0" baseline="0">
+              <a:solidFill>
+                <a:schemeClr val="tx1">
+                  <a:lumMod val="65000"/>
+                  <a:lumOff val="35000"/>
+                </a:schemeClr>
+              </a:solidFill>
+              <a:latin typeface="+mn-lt"/>
+              <a:ea typeface="+mn-ea"/>
+              <a:cs typeface="+mn-cs"/>
+            </a:defRPr>
+          </a:pPr>
+          <a:endParaRPr lang="ja-JP"/>
+        </a:p>
+      </c:txPr>
+    </c:title>
+    <c:autoTitleDeleted val="0"/>
+    <c:plotArea>
+      <c:layout>
+        <c:manualLayout>
+          <c:layoutTarget val="inner"/>
+          <c:xMode val="edge"/>
+          <c:yMode val="edge"/>
+          <c:x val="0.20354411691977425"/>
+          <c:y val="0.13120472157533067"/>
+          <c:w val="0.83665332408759308"/>
+          <c:h val="0.59951228111411448"/>
+        </c:manualLayout>
+      </c:layout>
+      <c:barChart>
+        <c:barDir val="bar"/>
+        <c:grouping val="percentStacked"/>
+        <c:varyColors val="0"/>
+        <c:ser>
+          <c:idx val="0"/>
+          <c:order val="0"/>
+          <c:tx>
+            <c:strRef>
+              <c:f>Sheet2!$A$4</c:f>
+              <c:strCache>
+                <c:ptCount val="1"/>
+                <c:pt idx="0">
+                  <c:v>Chemical and allied products</c:v>
+                </c:pt>
+              </c:strCache>
+            </c:strRef>
+          </c:tx>
+          <c:spPr>
+            <a:solidFill>
+              <a:schemeClr val="accent1"/>
+            </a:solidFill>
+            <a:ln>
+              <a:noFill/>
+            </a:ln>
+            <a:effectLst/>
+          </c:spPr>
+          <c:invertIfNegative val="0"/>
+          <c:dLbls>
+            <c:delete val="1"/>
+          </c:dLbls>
+          <c:cat>
+            <c:strRef>
+              <c:f>(Sheet2!$C$3,Sheet2!$E$3)</c:f>
+              <c:strCache>
+                <c:ptCount val="2"/>
+                <c:pt idx="0">
+                  <c:v>Whole Country</c:v>
+                </c:pt>
+                <c:pt idx="1">
+                  <c:v>Ube-shi</c:v>
+                </c:pt>
+              </c:strCache>
+            </c:strRef>
+          </c:cat>
+          <c:val>
+            <c:numRef>
+              <c:f>(Sheet2!$C$4,Sheet2!$E$4)</c:f>
+              <c:numCache>
+                <c:formatCode>General</c:formatCode>
+                <c:ptCount val="2"/>
+                <c:pt idx="0" formatCode="#,##0">
+                  <c:v>2793857700</c:v>
+                </c:pt>
+                <c:pt idx="1">
+                  <c:v>31907805</c:v>
+                </c:pt>
+              </c:numCache>
+            </c:numRef>
+          </c:val>
+          <c:extLst>
+            <c:ext xmlns:c16="http://schemas.microsoft.com/office/drawing/2014/chart" uri="{C3380CC4-5D6E-409C-BE32-E72D297353CC}">
+              <c16:uniqueId val="{00000000-997A-CC4C-8977-5932F2A3C11D}"/>
+            </c:ext>
+          </c:extLst>
+        </c:ser>
+        <c:ser>
+          <c:idx val="1"/>
+          <c:order val="1"/>
+          <c:tx>
+            <c:strRef>
+              <c:f>Sheet2!$A$5</c:f>
+              <c:strCache>
+                <c:ptCount val="1"/>
+                <c:pt idx="0">
+                  <c:v>Production machinery</c:v>
+                </c:pt>
+              </c:strCache>
+            </c:strRef>
+          </c:tx>
+          <c:spPr>
+            <a:solidFill>
+              <a:schemeClr val="accent2"/>
+            </a:solidFill>
+            <a:ln>
+              <a:noFill/>
+            </a:ln>
+            <a:effectLst/>
+          </c:spPr>
+          <c:invertIfNegative val="0"/>
+          <c:dLbls>
+            <c:delete val="1"/>
+          </c:dLbls>
+          <c:cat>
+            <c:strRef>
+              <c:f>(Sheet2!$C$3,Sheet2!$E$3)</c:f>
+              <c:strCache>
+                <c:ptCount val="2"/>
+                <c:pt idx="0">
+                  <c:v>Whole Country</c:v>
+                </c:pt>
+                <c:pt idx="1">
+                  <c:v>Ube-shi</c:v>
+                </c:pt>
+              </c:strCache>
+            </c:strRef>
+          </c:cat>
+          <c:val>
+            <c:numRef>
+              <c:f>(Sheet2!$C$5,Sheet2!$E$5)</c:f>
+              <c:numCache>
+                <c:formatCode>General</c:formatCode>
+                <c:ptCount val="2"/>
+                <c:pt idx="0" formatCode="#,##0">
+                  <c:v>1591070500</c:v>
+                </c:pt>
+                <c:pt idx="1">
+                  <c:v>4727355</c:v>
+                </c:pt>
+              </c:numCache>
+            </c:numRef>
+          </c:val>
+          <c:extLst>
+            <c:ext xmlns:c16="http://schemas.microsoft.com/office/drawing/2014/chart" uri="{C3380CC4-5D6E-409C-BE32-E72D297353CC}">
+              <c16:uniqueId val="{00000001-997A-CC4C-8977-5932F2A3C11D}"/>
+            </c:ext>
+          </c:extLst>
+        </c:ser>
+        <c:ser>
+          <c:idx val="2"/>
+          <c:order val="2"/>
+          <c:tx>
+            <c:strRef>
+              <c:f>Sheet2!$A$6</c:f>
+              <c:strCache>
+                <c:ptCount val="1"/>
+                <c:pt idx="0">
+                  <c:v>Ceramic, stone and clay products</c:v>
+                </c:pt>
+              </c:strCache>
+            </c:strRef>
+          </c:tx>
+          <c:spPr>
+            <a:solidFill>
+              <a:schemeClr val="accent3"/>
+            </a:solidFill>
+            <a:ln>
+              <a:noFill/>
+            </a:ln>
+            <a:effectLst/>
+          </c:spPr>
+          <c:invertIfNegative val="0"/>
+          <c:dLbls>
+            <c:delete val="1"/>
+          </c:dLbls>
+          <c:cat>
+            <c:strRef>
+              <c:f>(Sheet2!$C$3,Sheet2!$E$3)</c:f>
+              <c:strCache>
+                <c:ptCount val="2"/>
+                <c:pt idx="0">
+                  <c:v>Whole Country</c:v>
+                </c:pt>
+                <c:pt idx="1">
+                  <c:v>Ube-shi</c:v>
+                </c:pt>
+              </c:strCache>
+            </c:strRef>
+          </c:cat>
+          <c:val>
+            <c:numRef>
+              <c:f>(Sheet2!$C$6,Sheet2!$E$6)</c:f>
+              <c:numCache>
+                <c:formatCode>General</c:formatCode>
+                <c:ptCount val="2"/>
+                <c:pt idx="0" formatCode="#,##0">
+                  <c:v>676459200</c:v>
+                </c:pt>
+                <c:pt idx="1">
+                  <c:v>3618649</c:v>
+                </c:pt>
+              </c:numCache>
+            </c:numRef>
+          </c:val>
+          <c:extLst>
+            <c:ext xmlns:c16="http://schemas.microsoft.com/office/drawing/2014/chart" uri="{C3380CC4-5D6E-409C-BE32-E72D297353CC}">
+              <c16:uniqueId val="{00000002-997A-CC4C-8977-5932F2A3C11D}"/>
+            </c:ext>
+          </c:extLst>
+        </c:ser>
+        <c:ser>
+          <c:idx val="3"/>
+          <c:order val="3"/>
+          <c:tx>
+            <c:strRef>
+              <c:f>Sheet2!$A$7</c:f>
+              <c:strCache>
+                <c:ptCount val="1"/>
+                <c:pt idx="0">
+                  <c:v>Others</c:v>
+                </c:pt>
+              </c:strCache>
+            </c:strRef>
+          </c:tx>
+          <c:spPr>
+            <a:solidFill>
+              <a:schemeClr val="accent4"/>
+            </a:solidFill>
+            <a:ln>
+              <a:noFill/>
+            </a:ln>
+            <a:effectLst/>
+          </c:spPr>
+          <c:invertIfNegative val="0"/>
+          <c:dLbls>
+            <c:delete val="1"/>
+          </c:dLbls>
+          <c:cat>
+            <c:strRef>
+              <c:f>(Sheet2!$C$3,Sheet2!$E$3)</c:f>
+              <c:strCache>
+                <c:ptCount val="2"/>
+                <c:pt idx="0">
+                  <c:v>Whole Country</c:v>
+                </c:pt>
+                <c:pt idx="1">
+                  <c:v>Ube-shi</c:v>
+                </c:pt>
+              </c:strCache>
+            </c:strRef>
+          </c:cat>
+          <c:val>
+            <c:numRef>
+              <c:f>(Sheet2!$C$7,Sheet2!$E$7)</c:f>
+              <c:numCache>
+                <c:formatCode>#,##0</c:formatCode>
+                <c:ptCount val="2"/>
+                <c:pt idx="0">
+                  <c:v>24767392500</c:v>
+                </c:pt>
+                <c:pt idx="1">
+                  <c:v>7597987</c:v>
+                </c:pt>
+              </c:numCache>
+            </c:numRef>
+          </c:val>
+          <c:extLst>
+            <c:ext xmlns:c16="http://schemas.microsoft.com/office/drawing/2014/chart" uri="{C3380CC4-5D6E-409C-BE32-E72D297353CC}">
+              <c16:uniqueId val="{00000003-997A-CC4C-8977-5932F2A3C11D}"/>
+            </c:ext>
+          </c:extLst>
+        </c:ser>
+        <c:dLbls>
+          <c:showLegendKey val="0"/>
+          <c:showVal val="1"/>
+          <c:showCatName val="0"/>
+          <c:showSerName val="0"/>
+          <c:showPercent val="0"/>
+          <c:showBubbleSize val="0"/>
+        </c:dLbls>
+        <c:gapWidth val="150"/>
+        <c:overlap val="100"/>
+        <c:axId val="1088101935"/>
+        <c:axId val="1175820015"/>
+      </c:barChart>
+      <c:catAx>
+        <c:axId val="1088101935"/>
+        <c:scaling>
+          <c:orientation val="minMax"/>
+        </c:scaling>
+        <c:delete val="0"/>
+        <c:axPos val="l"/>
+        <c:numFmt formatCode="General" sourceLinked="1"/>
+        <c:majorTickMark val="none"/>
+        <c:minorTickMark val="none"/>
+        <c:tickLblPos val="nextTo"/>
+        <c:spPr>
+          <a:noFill/>
+          <a:ln w="9525" cap="flat" cmpd="sng" algn="ctr">
+            <a:solidFill>
+              <a:schemeClr val="tx1">
+                <a:lumMod val="15000"/>
+                <a:lumOff val="85000"/>
+              </a:schemeClr>
+            </a:solidFill>
+            <a:round/>
+          </a:ln>
+          <a:effectLst/>
+        </c:spPr>
+        <c:txPr>
+          <a:bodyPr rot="-60000000" spcFirstLastPara="1" vertOverflow="ellipsis" vert="horz" wrap="square" anchor="ctr" anchorCtr="1"/>
+          <a:lstStyle/>
+          <a:p>
+            <a:pPr>
+              <a:defRPr lang="ja-JP" sz="1100" b="0" i="0" u="none" strike="noStrike" kern="1200" baseline="0">
+                <a:solidFill>
+                  <a:schemeClr val="tx1">
+                    <a:lumMod val="65000"/>
+                    <a:lumOff val="35000"/>
+                  </a:schemeClr>
+                </a:solidFill>
+                <a:latin typeface="+mn-lt"/>
+                <a:ea typeface="+mn-ea"/>
+                <a:cs typeface="+mn-cs"/>
+              </a:defRPr>
+            </a:pPr>
+            <a:endParaRPr lang="ja-JP"/>
+          </a:p>
+        </c:txPr>
+        <c:crossAx val="1175820015"/>
+        <c:crosses val="autoZero"/>
+        <c:auto val="1"/>
+        <c:lblAlgn val="ctr"/>
+        <c:lblOffset val="100"/>
+        <c:noMultiLvlLbl val="0"/>
+      </c:catAx>
+      <c:valAx>
+        <c:axId val="1175820015"/>
+        <c:scaling>
+          <c:orientation val="minMax"/>
+        </c:scaling>
+        <c:delete val="0"/>
+        <c:axPos val="b"/>
+        <c:majorGridlines>
+          <c:spPr>
+            <a:ln w="9525" cap="flat" cmpd="sng" algn="ctr">
+              <a:solidFill>
+                <a:schemeClr val="tx1">
+                  <a:lumMod val="15000"/>
+                  <a:lumOff val="85000"/>
+                </a:schemeClr>
+              </a:solidFill>
+              <a:round/>
+            </a:ln>
+            <a:effectLst/>
+          </c:spPr>
+        </c:majorGridlines>
+        <c:numFmt formatCode="0%" sourceLinked="1"/>
+        <c:majorTickMark val="none"/>
+        <c:minorTickMark val="none"/>
+        <c:tickLblPos val="nextTo"/>
+        <c:spPr>
+          <a:noFill/>
+          <a:ln>
+            <a:noFill/>
+          </a:ln>
+          <a:effectLst/>
+        </c:spPr>
+        <c:txPr>
+          <a:bodyPr rot="-60000000" spcFirstLastPara="1" vertOverflow="ellipsis" vert="horz" wrap="square" anchor="ctr" anchorCtr="1"/>
+          <a:lstStyle/>
+          <a:p>
+            <a:pPr>
+              <a:defRPr lang="ja-JP" sz="900" b="0" i="0" u="none" strike="noStrike" kern="1200" baseline="0">
+                <a:solidFill>
+                  <a:schemeClr val="tx1">
+                    <a:lumMod val="65000"/>
+                    <a:lumOff val="35000"/>
+                  </a:schemeClr>
+                </a:solidFill>
+                <a:latin typeface="+mn-lt"/>
+                <a:ea typeface="+mn-ea"/>
+                <a:cs typeface="+mn-cs"/>
+              </a:defRPr>
+            </a:pPr>
+            <a:endParaRPr lang="ja-JP"/>
+          </a:p>
+        </c:txPr>
+        <c:crossAx val="1088101935"/>
+        <c:crosses val="autoZero"/>
+        <c:crossBetween val="between"/>
+      </c:valAx>
+      <c:spPr>
+        <a:noFill/>
+        <a:ln>
+          <a:noFill/>
+        </a:ln>
+        <a:effectLst/>
+      </c:spPr>
+    </c:plotArea>
+    <c:legend>
+      <c:legendPos val="b"/>
+      <c:layout>
+        <c:manualLayout>
+          <c:xMode val="edge"/>
+          <c:yMode val="edge"/>
+          <c:x val="0.10038630123436891"/>
+          <c:y val="0.80133795414654296"/>
+          <c:w val="0.79922711478327013"/>
+          <c:h val="0.11701031186545674"/>
+        </c:manualLayout>
+      </c:layout>
+      <c:overlay val="0"/>
+      <c:spPr>
+        <a:noFill/>
+        <a:ln>
+          <a:noFill/>
+        </a:ln>
+        <a:effectLst/>
+      </c:spPr>
+      <c:txPr>
+        <a:bodyPr rot="0" spcFirstLastPara="1" vertOverflow="ellipsis" vert="horz" wrap="square" anchor="ctr" anchorCtr="1"/>
+        <a:lstStyle/>
+        <a:p>
+          <a:pPr>
+            <a:defRPr lang="ja-JP" sz="900" b="0" i="0" u="none" strike="noStrike" kern="1200" baseline="0">
+              <a:solidFill>
+                <a:schemeClr val="tx1">
+                  <a:lumMod val="65000"/>
+                  <a:lumOff val="35000"/>
+                </a:schemeClr>
+              </a:solidFill>
+              <a:latin typeface="+mn-lt"/>
+              <a:ea typeface="+mn-ea"/>
+              <a:cs typeface="+mn-cs"/>
+            </a:defRPr>
+          </a:pPr>
+          <a:endParaRPr lang="ja-JP"/>
+        </a:p>
+      </c:txPr>
+    </c:legend>
+    <c:plotVisOnly val="1"/>
+    <c:dispBlanksAs val="gap"/>
+    <c:extLst>
+      <c:ext xmlns:c16r3="http://schemas.microsoft.com/office/drawing/2017/03/chart" uri="{56B9EC1D-385E-4148-901F-78D8002777C0}">
+        <c16r3:dataDisplayOptions16>
+          <c16r3:dispNaAsBlank val="1"/>
+        </c16r3:dataDisplayOptions16>
+      </c:ext>
+    </c:extLst>
+    <c:showDLblsOverMax val="0"/>
+  </c:chart>
+  <c:spPr>
+    <a:noFill/>
+    <a:ln>
+      <a:noFill/>
+    </a:ln>
+    <a:effectLst/>
+  </c:spPr>
+  <c:txPr>
+    <a:bodyPr/>
+    <a:lstStyle/>
+    <a:p>
+      <a:pPr>
+        <a:defRPr/>
+      </a:pPr>
+      <a:endParaRPr lang="ja-JP"/>
+    </a:p>
+  </c:txPr>
+  <c:externalData r:id="rId3">
+    <c:autoUpdate val="0"/>
+  </c:externalData>
+  <c:userShapes r:id="rId4"/>
+</c:chartSpace>
+</file>
+
+<file path=ppt/charts/colors1.xml><?xml version="1.0" encoding="utf-8"?>
+<cs:colorStyle xmlns:cs="http://schemas.microsoft.com/office/drawing/2012/chartStyle" xmlns:a="http://schemas.openxmlformats.org/drawingml/2006/main" meth="cycle" id="10">
+  <a:schemeClr val="accent1"/>
+  <a:schemeClr val="accent2"/>
+  <a:schemeClr val="accent3"/>
+  <a:schemeClr val="accent4"/>
+  <a:schemeClr val="accent5"/>
+  <a:schemeClr val="accent6"/>
+  <cs:variation/>
+  <cs:variation>
+    <a:lumMod val="60000"/>
+  </cs:variation>
+  <cs:variation>
+    <a:lumMod val="80000"/>
+    <a:lumOff val="20000"/>
+  </cs:variation>
+  <cs:variation>
+    <a:lumMod val="80000"/>
+  </cs:variation>
+  <cs:variation>
+    <a:lumMod val="60000"/>
+    <a:lumOff val="40000"/>
+  </cs:variation>
+  <cs:variation>
+    <a:lumMod val="50000"/>
+  </cs:variation>
+  <cs:variation>
+    <a:lumMod val="70000"/>
+    <a:lumOff val="30000"/>
+  </cs:variation>
+  <cs:variation>
+    <a:lumMod val="70000"/>
+  </cs:variation>
+  <cs:variation>
+    <a:lumMod val="50000"/>
+    <a:lumOff val="50000"/>
+  </cs:variation>
+</cs:colorStyle>
+</file>
+
+<file path=ppt/charts/colors2.xml><?xml version="1.0" encoding="utf-8"?>
+<cs:colorStyle xmlns:cs="http://schemas.microsoft.com/office/drawing/2012/chartStyle" xmlns:a="http://schemas.openxmlformats.org/drawingml/2006/main" meth="cycle" id="10">
+  <a:schemeClr val="accent1"/>
+  <a:schemeClr val="accent2"/>
+  <a:schemeClr val="accent3"/>
+  <a:schemeClr val="accent4"/>
+  <a:schemeClr val="accent5"/>
+  <a:schemeClr val="accent6"/>
+  <cs:variation/>
+  <cs:variation>
+    <a:lumMod val="60000"/>
+  </cs:variation>
+  <cs:variation>
+    <a:lumMod val="80000"/>
+    <a:lumOff val="20000"/>
+  </cs:variation>
+  <cs:variation>
+    <a:lumMod val="80000"/>
+  </cs:variation>
+  <cs:variation>
+    <a:lumMod val="60000"/>
+    <a:lumOff val="40000"/>
+  </cs:variation>
+  <cs:variation>
+    <a:lumMod val="50000"/>
+  </cs:variation>
+  <cs:variation>
+    <a:lumMod val="70000"/>
+    <a:lumOff val="30000"/>
+  </cs:variation>
+  <cs:variation>
+    <a:lumMod val="70000"/>
+  </cs:variation>
+  <cs:variation>
+    <a:lumMod val="50000"/>
+    <a:lumOff val="50000"/>
+  </cs:variation>
+</cs:colorStyle>
+</file>
+
+<file path=ppt/charts/style1.xml><?xml version="1.0" encoding="utf-8"?>
+<cs:chartStyle xmlns:cs="http://schemas.microsoft.com/office/drawing/2012/chartStyle" xmlns:a="http://schemas.openxmlformats.org/drawingml/2006/main" id="251">
+  <cs:axisTitle>
+    <cs:lnRef idx="0"/>
+    <cs:fillRef idx="0"/>
+    <cs:effectRef idx="0"/>
+    <cs:fontRef idx="minor">
+      <a:schemeClr val="tx1">
+        <a:lumMod val="65000"/>
+        <a:lumOff val="35000"/>
+      </a:schemeClr>
+    </cs:fontRef>
+    <cs:defRPr sz="1000" kern="1200"/>
+  </cs:axisTitle>
+  <cs:categoryAxis>
+    <cs:lnRef idx="0"/>
+    <cs:fillRef idx="0"/>
+    <cs:effectRef idx="0"/>
+    <cs:fontRef idx="minor">
+      <a:schemeClr val="tx1">
+        <a:lumMod val="65000"/>
+        <a:lumOff val="35000"/>
+      </a:schemeClr>
+    </cs:fontRef>
+    <cs:spPr>
+      <a:ln w="9525" cap="flat" cmpd="sng" algn="ctr">
+        <a:solidFill>
+          <a:schemeClr val="tx1">
+            <a:lumMod val="15000"/>
+            <a:lumOff val="85000"/>
+          </a:schemeClr>
+        </a:solidFill>
+        <a:round/>
+      </a:ln>
+    </cs:spPr>
+    <cs:defRPr sz="900" kern="1200"/>
+  </cs:categoryAxis>
+  <cs:chartArea mods="allowNoFillOverride allowNoLineOverride">
+    <cs:lnRef idx="0"/>
+    <cs:fillRef idx="0"/>
+    <cs:effectRef idx="0"/>
+    <cs:fontRef idx="minor">
+      <a:schemeClr val="tx1"/>
+    </cs:fontRef>
+    <cs:spPr>
+      <a:solidFill>
+        <a:schemeClr val="bg1"/>
+      </a:solidFill>
+      <a:ln w="9525" cap="flat" cmpd="sng" algn="ctr">
+        <a:solidFill>
+          <a:schemeClr val="tx1">
+            <a:lumMod val="15000"/>
+            <a:lumOff val="85000"/>
+          </a:schemeClr>
+        </a:solidFill>
+        <a:round/>
+      </a:ln>
+    </cs:spPr>
+    <cs:defRPr sz="900" kern="1200"/>
+  </cs:chartArea>
+  <cs:dataLabel>
+    <cs:lnRef idx="0"/>
+    <cs:fillRef idx="0"/>
+    <cs:effectRef idx="0"/>
+    <cs:fontRef idx="minor">
+      <a:schemeClr val="tx1">
+        <a:lumMod val="75000"/>
+        <a:lumOff val="25000"/>
+      </a:schemeClr>
+    </cs:fontRef>
+    <cs:defRPr sz="900" kern="1200"/>
+  </cs:dataLabel>
+  <cs:dataLabelCallout>
+    <cs:lnRef idx="0"/>
+    <cs:fillRef idx="0"/>
+    <cs:effectRef idx="0"/>
+    <cs:fontRef idx="minor">
+      <a:schemeClr val="dk1">
+        <a:lumMod val="65000"/>
+        <a:lumOff val="35000"/>
+      </a:schemeClr>
+    </cs:fontRef>
+    <cs:spPr>
+      <a:solidFill>
+        <a:schemeClr val="lt1"/>
+      </a:solidFill>
+      <a:ln>
+        <a:solidFill>
+          <a:schemeClr val="dk1">
+            <a:lumMod val="25000"/>
+            <a:lumOff val="75000"/>
+          </a:schemeClr>
+        </a:solidFill>
+      </a:ln>
+    </cs:spPr>
+    <cs:defRPr sz="900" kern="1200"/>
+    <cs:bodyPr rot="0" spcFirstLastPara="1" vertOverflow="clip" horzOverflow="clip" vert="horz" wrap="square" lIns="36576" tIns="18288" rIns="36576" bIns="18288" anchor="ctr" anchorCtr="1">
+      <a:spAutoFit/>
+    </cs:bodyPr>
+  </cs:dataLabelCallout>
+  <cs:dataPoint>
+    <cs:lnRef idx="0"/>
+    <cs:fillRef idx="1">
+      <cs:styleClr val="auto"/>
+    </cs:fillRef>
+    <cs:effectRef idx="0"/>
+    <cs:fontRef idx="minor">
+      <a:schemeClr val="tx1"/>
+    </cs:fontRef>
+    <cs:spPr>
+      <a:ln w="19050">
+        <a:solidFill>
+          <a:schemeClr val="lt1"/>
+        </a:solidFill>
+      </a:ln>
+    </cs:spPr>
+  </cs:dataPoint>
+  <cs:dataPoint3D>
+    <cs:lnRef idx="0"/>
+    <cs:fillRef idx="1">
+      <cs:styleClr val="auto"/>
+    </cs:fillRef>
+    <cs:effectRef idx="0"/>
+    <cs:fontRef idx="minor">
+      <a:schemeClr val="tx1"/>
+    </cs:fontRef>
+    <cs:spPr>
+      <a:ln w="25400">
+        <a:solidFill>
+          <a:schemeClr val="lt1"/>
+        </a:solidFill>
+      </a:ln>
+    </cs:spPr>
+  </cs:dataPoint3D>
+  <cs:dataPointLine>
+    <cs:lnRef idx="0">
+      <cs:styleClr val="auto"/>
+    </cs:lnRef>
+    <cs:fillRef idx="0"/>
+    <cs:effectRef idx="0"/>
+    <cs:fontRef idx="minor">
+      <a:schemeClr val="tx1"/>
+    </cs:fontRef>
+    <cs:spPr>
+      <a:ln w="28575" cap="rnd">
+        <a:solidFill>
+          <a:schemeClr val="phClr"/>
+        </a:solidFill>
+        <a:round/>
+      </a:ln>
+    </cs:spPr>
+  </cs:dataPointLine>
+  <cs:dataPointMarker>
+    <cs:lnRef idx="0">
+      <cs:styleClr val="auto"/>
+    </cs:lnRef>
+    <cs:fillRef idx="1">
+      <cs:styleClr val="auto"/>
+    </cs:fillRef>
+    <cs:effectRef idx="0"/>
+    <cs:fontRef idx="minor">
+      <a:schemeClr val="tx1"/>
+    </cs:fontRef>
+    <cs:spPr>
+      <a:ln w="9525">
+        <a:solidFill>
+          <a:schemeClr val="phClr"/>
+        </a:solidFill>
+      </a:ln>
+    </cs:spPr>
+  </cs:dataPointMarker>
+  <cs:dataPointMarkerLayout symbol="circle" size="5"/>
+  <cs:dataPointWireframe>
+    <cs:lnRef idx="0">
+      <cs:styleClr val="auto"/>
+    </cs:lnRef>
+    <cs:fillRef idx="0"/>
+    <cs:effectRef idx="0"/>
+    <cs:fontRef idx="minor">
+      <a:schemeClr val="tx1"/>
+    </cs:fontRef>
+    <cs:spPr>
+      <a:ln w="9525" cap="rnd">
+        <a:solidFill>
+          <a:schemeClr val="phClr"/>
+        </a:solidFill>
+        <a:round/>
+      </a:ln>
+    </cs:spPr>
+  </cs:dataPointWireframe>
+  <cs:dataTable>
+    <cs:lnRef idx="0"/>
+    <cs:fillRef idx="0"/>
+    <cs:effectRef idx="0"/>
+    <cs:fontRef idx="minor">
+      <a:schemeClr val="tx1">
+        <a:lumMod val="65000"/>
+        <a:lumOff val="35000"/>
+      </a:schemeClr>
+    </cs:fontRef>
+    <cs:spPr>
+      <a:noFill/>
+      <a:ln w="9525" cap="flat" cmpd="sng" algn="ctr">
+        <a:solidFill>
+          <a:schemeClr val="tx1">
+            <a:lumMod val="15000"/>
+            <a:lumOff val="85000"/>
+          </a:schemeClr>
+        </a:solidFill>
+        <a:round/>
+      </a:ln>
+    </cs:spPr>
+    <cs:defRPr sz="900" kern="1200"/>
+  </cs:dataTable>
+  <cs:downBar>
+    <cs:lnRef idx="0"/>
+    <cs:fillRef idx="0"/>
+    <cs:effectRef idx="0"/>
+    <cs:fontRef idx="minor">
+      <a:schemeClr val="tx1"/>
+    </cs:fontRef>
+    <cs:spPr>
+      <a:solidFill>
+        <a:schemeClr val="dk1">
+          <a:lumMod val="75000"/>
+          <a:lumOff val="25000"/>
+        </a:schemeClr>
+      </a:solidFill>
+      <a:ln w="9525" cap="flat" cmpd="sng" algn="ctr">
+        <a:solidFill>
+          <a:schemeClr val="tx1">
+            <a:lumMod val="65000"/>
+            <a:lumOff val="35000"/>
+          </a:schemeClr>
+        </a:solidFill>
+        <a:round/>
+      </a:ln>
+    </cs:spPr>
+  </cs:downBar>
+  <cs:dropLine>
+    <cs:lnRef idx="0"/>
+    <cs:fillRef idx="0"/>
+    <cs:effectRef idx="0"/>
+    <cs:fontRef idx="minor">
+      <a:schemeClr val="tx1"/>
+    </cs:fontRef>
+    <cs:spPr>
+      <a:ln w="9525" cap="flat" cmpd="sng" algn="ctr">
+        <a:solidFill>
+          <a:schemeClr val="tx1">
+            <a:lumMod val="35000"/>
+            <a:lumOff val="65000"/>
+          </a:schemeClr>
+        </a:solidFill>
+        <a:round/>
+      </a:ln>
+    </cs:spPr>
+  </cs:dropLine>
+  <cs:errorBar>
+    <cs:lnRef idx="0"/>
+    <cs:fillRef idx="0"/>
+    <cs:effectRef idx="0"/>
+    <cs:fontRef idx="minor">
+      <a:schemeClr val="tx1"/>
+    </cs:fontRef>
+    <cs:spPr>
+      <a:ln w="9525" cap="flat" cmpd="sng" algn="ctr">
+        <a:solidFill>
+          <a:schemeClr val="tx1">
+            <a:lumMod val="65000"/>
+            <a:lumOff val="35000"/>
+          </a:schemeClr>
+        </a:solidFill>
+        <a:round/>
+      </a:ln>
+    </cs:spPr>
+  </cs:errorBar>
+  <cs:floor>
+    <cs:lnRef idx="0"/>
+    <cs:fillRef idx="0"/>
+    <cs:effectRef idx="0"/>
+    <cs:fontRef idx="minor">
+      <a:schemeClr val="tx1"/>
+    </cs:fontRef>
+    <cs:spPr>
+      <a:noFill/>
+      <a:ln>
+        <a:noFill/>
+      </a:ln>
+    </cs:spPr>
+  </cs:floor>
+  <cs:gridlineMajor>
+    <cs:lnRef idx="0"/>
+    <cs:fillRef idx="0"/>
+    <cs:effectRef idx="0"/>
+    <cs:fontRef idx="minor">
+      <a:schemeClr val="tx1"/>
+    </cs:fontRef>
+    <cs:spPr>
+      <a:ln w="9525" cap="flat" cmpd="sng" algn="ctr">
+        <a:solidFill>
+          <a:schemeClr val="tx1">
+            <a:lumMod val="15000"/>
+            <a:lumOff val="85000"/>
+          </a:schemeClr>
+        </a:solidFill>
+        <a:round/>
+      </a:ln>
+    </cs:spPr>
+  </cs:gridlineMajor>
+  <cs:gridlineMinor>
+    <cs:lnRef idx="0"/>
+    <cs:fillRef idx="0"/>
+    <cs:effectRef idx="0"/>
+    <cs:fontRef idx="minor">
+      <a:schemeClr val="tx1"/>
+    </cs:fontRef>
+    <cs:spPr>
+      <a:ln w="9525" cap="flat" cmpd="sng" algn="ctr">
+        <a:solidFill>
+          <a:schemeClr val="tx1">
+            <a:lumMod val="5000"/>
+            <a:lumOff val="95000"/>
+          </a:schemeClr>
+        </a:solidFill>
+        <a:round/>
+      </a:ln>
+    </cs:spPr>
+  </cs:gridlineMinor>
+  <cs:hiLoLine>
+    <cs:lnRef idx="0"/>
+    <cs:fillRef idx="0"/>
+    <cs:effectRef idx="0"/>
+    <cs:fontRef idx="minor">
+      <a:schemeClr val="tx1"/>
+    </cs:fontRef>
+    <cs:spPr>
+      <a:ln w="9525" cap="flat" cmpd="sng" algn="ctr">
+        <a:solidFill>
+          <a:schemeClr val="tx1">
+            <a:lumMod val="50000"/>
+            <a:lumOff val="50000"/>
+          </a:schemeClr>
+        </a:solidFill>
+        <a:round/>
+      </a:ln>
+    </cs:spPr>
+  </cs:hiLoLine>
+  <cs:leaderLine>
+    <cs:lnRef idx="0"/>
+    <cs:fillRef idx="0"/>
+    <cs:effectRef idx="0"/>
+    <cs:fontRef idx="minor">
+      <a:schemeClr val="tx1"/>
+    </cs:fontRef>
+    <cs:spPr>
+      <a:ln w="9525" cap="flat" cmpd="sng" algn="ctr">
+        <a:solidFill>
+          <a:schemeClr val="tx1">
+            <a:lumMod val="35000"/>
+            <a:lumOff val="65000"/>
+          </a:schemeClr>
+        </a:solidFill>
+        <a:round/>
+      </a:ln>
+    </cs:spPr>
+  </cs:leaderLine>
+  <cs:legend>
+    <cs:lnRef idx="0"/>
+    <cs:fillRef idx="0"/>
+    <cs:effectRef idx="0"/>
+    <cs:fontRef idx="minor">
+      <a:schemeClr val="tx1">
+        <a:lumMod val="65000"/>
+        <a:lumOff val="35000"/>
+      </a:schemeClr>
+    </cs:fontRef>
+    <cs:defRPr sz="900" kern="1200"/>
+  </cs:legend>
+  <cs:plotArea mods="allowNoFillOverride allowNoLineOverride">
+    <cs:lnRef idx="0"/>
+    <cs:fillRef idx="0"/>
+    <cs:effectRef idx="0"/>
+    <cs:fontRef idx="minor">
+      <a:schemeClr val="tx1"/>
+    </cs:fontRef>
+  </cs:plotArea>
+  <cs:plotArea3D mods="allowNoFillOverride allowNoLineOverride">
+    <cs:lnRef idx="0"/>
+    <cs:fillRef idx="0"/>
+    <cs:effectRef idx="0"/>
+    <cs:fontRef idx="minor">
+      <a:schemeClr val="tx1"/>
+    </cs:fontRef>
+  </cs:plotArea3D>
+  <cs:seriesAxis>
+    <cs:lnRef idx="0"/>
+    <cs:fillRef idx="0"/>
+    <cs:effectRef idx="0"/>
+    <cs:fontRef idx="minor">
+      <a:schemeClr val="tx1">
+        <a:lumMod val="65000"/>
+        <a:lumOff val="35000"/>
+      </a:schemeClr>
+    </cs:fontRef>
+    <cs:defRPr sz="900" kern="1200"/>
+  </cs:seriesAxis>
+  <cs:seriesLine>
+    <cs:lnRef idx="0"/>
+    <cs:fillRef idx="0"/>
+    <cs:effectRef idx="0"/>
+    <cs:fontRef idx="minor">
+      <a:schemeClr val="tx1"/>
+    </cs:fontRef>
+    <cs:spPr>
+      <a:ln w="9525" cap="flat" cmpd="sng" algn="ctr">
+        <a:solidFill>
+          <a:schemeClr val="tx1">
+            <a:lumMod val="35000"/>
+            <a:lumOff val="65000"/>
+          </a:schemeClr>
+        </a:solidFill>
+        <a:round/>
+      </a:ln>
+    </cs:spPr>
+  </cs:seriesLine>
+  <cs:title>
+    <cs:lnRef idx="0"/>
+    <cs:fillRef idx="0"/>
+    <cs:effectRef idx="0"/>
+    <cs:fontRef idx="minor">
+      <a:schemeClr val="tx1">
+        <a:lumMod val="65000"/>
+        <a:lumOff val="35000"/>
+      </a:schemeClr>
+    </cs:fontRef>
+    <cs:defRPr sz="1400" b="0" kern="1200" spc="0" baseline="0"/>
+  </cs:title>
+  <cs:trendline>
+    <cs:lnRef idx="0">
+      <cs:styleClr val="auto"/>
+    </cs:lnRef>
+    <cs:fillRef idx="0"/>
+    <cs:effectRef idx="0"/>
+    <cs:fontRef idx="minor">
+      <a:schemeClr val="tx1"/>
+    </cs:fontRef>
+    <cs:spPr>
+      <a:ln w="19050" cap="rnd">
+        <a:solidFill>
+          <a:schemeClr val="phClr"/>
+        </a:solidFill>
+        <a:prstDash val="sysDot"/>
+      </a:ln>
+    </cs:spPr>
+  </cs:trendline>
+  <cs:trendlineLabel>
+    <cs:lnRef idx="0"/>
+    <cs:fillRef idx="0"/>
+    <cs:effectRef idx="0"/>
+    <cs:fontRef idx="minor">
+      <a:schemeClr val="tx1">
+        <a:lumMod val="65000"/>
+        <a:lumOff val="35000"/>
+      </a:schemeClr>
+    </cs:fontRef>
+    <cs:defRPr sz="900" kern="1200"/>
+  </cs:trendlineLabel>
+  <cs:upBar>
+    <cs:lnRef idx="0"/>
+    <cs:fillRef idx="0"/>
+    <cs:effectRef idx="0"/>
+    <cs:fontRef idx="minor">
+      <a:schemeClr val="tx1"/>
+    </cs:fontRef>
+    <cs:spPr>
+      <a:solidFill>
+        <a:schemeClr val="lt1"/>
+      </a:solidFill>
+      <a:ln w="9525" cap="flat" cmpd="sng" algn="ctr">
+        <a:solidFill>
+          <a:schemeClr val="tx1">
+            <a:lumMod val="65000"/>
+            <a:lumOff val="35000"/>
+          </a:schemeClr>
+        </a:solidFill>
+        <a:round/>
+      </a:ln>
+    </cs:spPr>
+  </cs:upBar>
+  <cs:valueAxis>
+    <cs:lnRef idx="0"/>
+    <cs:fillRef idx="0"/>
+    <cs:effectRef idx="0"/>
+    <cs:fontRef idx="minor">
+      <a:schemeClr val="tx1">
+        <a:lumMod val="65000"/>
+        <a:lumOff val="35000"/>
+      </a:schemeClr>
+    </cs:fontRef>
+    <cs:defRPr sz="900" kern="1200"/>
+  </cs:valueAxis>
+  <cs:wall>
+    <cs:lnRef idx="0"/>
+    <cs:fillRef idx="0"/>
+    <cs:effectRef idx="0"/>
+    <cs:fontRef idx="minor">
+      <a:schemeClr val="tx1"/>
+    </cs:fontRef>
+    <cs:spPr>
+      <a:noFill/>
+      <a:ln>
+        <a:noFill/>
+      </a:ln>
+    </cs:spPr>
+  </cs:wall>
+</cs:chartStyle>
+</file>
+
+<file path=ppt/charts/style2.xml><?xml version="1.0" encoding="utf-8"?>
+<cs:chartStyle xmlns:cs="http://schemas.microsoft.com/office/drawing/2012/chartStyle" xmlns:a="http://schemas.openxmlformats.org/drawingml/2006/main" id="297">
+  <cs:axisTitle>
+    <cs:lnRef idx="0"/>
+    <cs:fillRef idx="0"/>
+    <cs:effectRef idx="0"/>
+    <cs:fontRef idx="minor">
+      <a:schemeClr val="tx1">
+        <a:lumMod val="65000"/>
+        <a:lumOff val="35000"/>
+      </a:schemeClr>
+    </cs:fontRef>
+    <cs:defRPr sz="1000" kern="1200"/>
+  </cs:axisTitle>
+  <cs:categoryAxis>
+    <cs:lnRef idx="0"/>
+    <cs:fillRef idx="0"/>
+    <cs:effectRef idx="0"/>
+    <cs:fontRef idx="minor">
+      <a:schemeClr val="tx1">
+        <a:lumMod val="65000"/>
+        <a:lumOff val="35000"/>
+      </a:schemeClr>
+    </cs:fontRef>
+    <cs:spPr>
+      <a:ln w="9525" cap="flat" cmpd="sng" algn="ctr">
+        <a:solidFill>
+          <a:schemeClr val="tx1">
+            <a:lumMod val="15000"/>
+            <a:lumOff val="85000"/>
+          </a:schemeClr>
+        </a:solidFill>
+        <a:round/>
+      </a:ln>
+    </cs:spPr>
+    <cs:defRPr sz="900" kern="1200"/>
+  </cs:categoryAxis>
+  <cs:chartArea mods="allowNoFillOverride allowNoLineOverride">
+    <cs:lnRef idx="0"/>
+    <cs:fillRef idx="0"/>
+    <cs:effectRef idx="0"/>
+    <cs:fontRef idx="minor">
+      <a:schemeClr val="tx1"/>
+    </cs:fontRef>
+    <cs:spPr>
+      <a:solidFill>
+        <a:schemeClr val="bg1"/>
+      </a:solidFill>
+      <a:ln w="9525" cap="flat" cmpd="sng" algn="ctr">
+        <a:solidFill>
+          <a:schemeClr val="tx1">
+            <a:lumMod val="15000"/>
+            <a:lumOff val="85000"/>
+          </a:schemeClr>
+        </a:solidFill>
+        <a:round/>
+      </a:ln>
+    </cs:spPr>
+    <cs:defRPr sz="1000" kern="1200"/>
+  </cs:chartArea>
+  <cs:dataLabel>
+    <cs:lnRef idx="0"/>
+    <cs:fillRef idx="0"/>
+    <cs:effectRef idx="0"/>
+    <cs:fontRef idx="minor">
+      <a:schemeClr val="tx1">
+        <a:lumMod val="75000"/>
+        <a:lumOff val="25000"/>
+      </a:schemeClr>
+    </cs:fontRef>
+    <cs:defRPr sz="900" kern="1200"/>
+  </cs:dataLabel>
+  <cs:dataLabelCallout>
+    <cs:lnRef idx="0"/>
+    <cs:fillRef idx="0"/>
+    <cs:effectRef idx="0"/>
+    <cs:fontRef idx="minor">
+      <a:schemeClr val="dk1">
+        <a:lumMod val="65000"/>
+        <a:lumOff val="35000"/>
+      </a:schemeClr>
+    </cs:fontRef>
+    <cs:spPr>
+      <a:solidFill>
+        <a:schemeClr val="lt1"/>
+      </a:solidFill>
+      <a:ln>
+        <a:solidFill>
+          <a:schemeClr val="dk1">
+            <a:lumMod val="25000"/>
+            <a:lumOff val="75000"/>
+          </a:schemeClr>
+        </a:solidFill>
+      </a:ln>
+    </cs:spPr>
+    <cs:defRPr sz="900" kern="1200"/>
+    <cs:bodyPr rot="0" spcFirstLastPara="1" vertOverflow="clip" horzOverflow="clip" vert="horz" wrap="square" lIns="36576" tIns="18288" rIns="36576" bIns="18288" anchor="ctr" anchorCtr="1">
+      <a:spAutoFit/>
+    </cs:bodyPr>
+  </cs:dataLabelCallout>
+  <cs:dataPoint>
+    <cs:lnRef idx="0"/>
+    <cs:fillRef idx="1">
+      <cs:styleClr val="auto"/>
+    </cs:fillRef>
+    <cs:effectRef idx="0"/>
+    <cs:fontRef idx="minor">
+      <a:schemeClr val="tx1"/>
+    </cs:fontRef>
+  </cs:dataPoint>
+  <cs:dataPoint3D>
+    <cs:lnRef idx="0"/>
+    <cs:fillRef idx="1">
+      <cs:styleClr val="auto"/>
+    </cs:fillRef>
+    <cs:effectRef idx="0"/>
+    <cs:fontRef idx="minor">
+      <a:schemeClr val="tx1"/>
+    </cs:fontRef>
+  </cs:dataPoint3D>
+  <cs:dataPointLine>
+    <cs:lnRef idx="0">
+      <cs:styleClr val="auto"/>
+    </cs:lnRef>
+    <cs:fillRef idx="1"/>
+    <cs:effectRef idx="0"/>
+    <cs:fontRef idx="minor">
+      <a:schemeClr val="tx1"/>
+    </cs:fontRef>
+    <cs:spPr>
+      <a:ln w="28575" cap="rnd">
+        <a:solidFill>
+          <a:schemeClr val="phClr"/>
+        </a:solidFill>
+        <a:round/>
+      </a:ln>
+    </cs:spPr>
+  </cs:dataPointLine>
+  <cs:dataPointMarker>
+    <cs:lnRef idx="0">
+      <cs:styleClr val="auto"/>
+    </cs:lnRef>
+    <cs:fillRef idx="1">
+      <cs:styleClr val="auto"/>
+    </cs:fillRef>
+    <cs:effectRef idx="0"/>
+    <cs:fontRef idx="minor">
+      <a:schemeClr val="tx1"/>
+    </cs:fontRef>
+    <cs:spPr>
+      <a:ln w="9525">
+        <a:solidFill>
+          <a:schemeClr val="phClr"/>
+        </a:solidFill>
+      </a:ln>
+    </cs:spPr>
+  </cs:dataPointMarker>
+  <cs:dataPointMarkerLayout symbol="circle" size="5"/>
+  <cs:dataPointWireframe>
+    <cs:lnRef idx="0">
+      <cs:styleClr val="auto"/>
+    </cs:lnRef>
+    <cs:fillRef idx="1"/>
+    <cs:effectRef idx="0"/>
+    <cs:fontRef idx="minor">
+      <a:schemeClr val="tx1"/>
+    </cs:fontRef>
+    <cs:spPr>
+      <a:ln w="9525" cap="rnd">
+        <a:solidFill>
+          <a:schemeClr val="phClr"/>
+        </a:solidFill>
+        <a:round/>
+      </a:ln>
+    </cs:spPr>
+  </cs:dataPointWireframe>
+  <cs:dataTable>
+    <cs:lnRef idx="0"/>
+    <cs:fillRef idx="0"/>
+    <cs:effectRef idx="0"/>
+    <cs:fontRef idx="minor">
+      <a:schemeClr val="tx1">
+        <a:lumMod val="65000"/>
+        <a:lumOff val="35000"/>
+      </a:schemeClr>
+    </cs:fontRef>
+    <cs:spPr>
+      <a:noFill/>
+      <a:ln w="9525" cap="flat" cmpd="sng" algn="ctr">
+        <a:solidFill>
+          <a:schemeClr val="tx1">
+            <a:lumMod val="15000"/>
+            <a:lumOff val="85000"/>
+          </a:schemeClr>
+        </a:solidFill>
+        <a:round/>
+      </a:ln>
+    </cs:spPr>
+    <cs:defRPr sz="900" kern="1200"/>
+  </cs:dataTable>
+  <cs:downBar>
+    <cs:lnRef idx="0"/>
+    <cs:fillRef idx="0"/>
+    <cs:effectRef idx="0"/>
+    <cs:fontRef idx="minor">
+      <a:schemeClr val="tx1"/>
+    </cs:fontRef>
+    <cs:spPr>
+      <a:solidFill>
+        <a:schemeClr val="dk1">
+          <a:lumMod val="75000"/>
+          <a:lumOff val="25000"/>
+        </a:schemeClr>
+      </a:solidFill>
+      <a:ln w="9525" cap="flat" cmpd="sng" algn="ctr">
+        <a:solidFill>
+          <a:schemeClr val="tx1">
+            <a:lumMod val="65000"/>
+            <a:lumOff val="35000"/>
+          </a:schemeClr>
+        </a:solidFill>
+        <a:round/>
+      </a:ln>
+    </cs:spPr>
+  </cs:downBar>
+  <cs:dropLine>
+    <cs:lnRef idx="0"/>
+    <cs:fillRef idx="0"/>
+    <cs:effectRef idx="0"/>
+    <cs:fontRef idx="minor">
+      <a:schemeClr val="tx1"/>
+    </cs:fontRef>
+    <cs:spPr>
+      <a:ln w="9525" cap="flat" cmpd="sng" algn="ctr">
+        <a:solidFill>
+          <a:schemeClr val="tx1">
+            <a:lumMod val="35000"/>
+            <a:lumOff val="65000"/>
+          </a:schemeClr>
+        </a:solidFill>
+        <a:round/>
+      </a:ln>
+    </cs:spPr>
+  </cs:dropLine>
+  <cs:errorBar>
+    <cs:lnRef idx="0"/>
+    <cs:fillRef idx="0"/>
+    <cs:effectRef idx="0"/>
+    <cs:fontRef idx="minor">
+      <a:schemeClr val="tx1"/>
+    </cs:fontRef>
+    <cs:spPr>
+      <a:ln w="9525" cap="flat" cmpd="sng" algn="ctr">
+        <a:solidFill>
+          <a:schemeClr val="tx1">
+            <a:lumMod val="65000"/>
+            <a:lumOff val="35000"/>
+          </a:schemeClr>
+        </a:solidFill>
+        <a:round/>
+      </a:ln>
+    </cs:spPr>
+  </cs:errorBar>
+  <cs:floor>
+    <cs:lnRef idx="0"/>
+    <cs:fillRef idx="0"/>
+    <cs:effectRef idx="0"/>
+    <cs:fontRef idx="minor">
+      <a:schemeClr val="tx1"/>
+    </cs:fontRef>
+    <cs:spPr>
+      <a:noFill/>
+      <a:ln>
+        <a:noFill/>
+      </a:ln>
+    </cs:spPr>
+  </cs:floor>
+  <cs:gridlineMajor>
+    <cs:lnRef idx="0"/>
+    <cs:fillRef idx="0"/>
+    <cs:effectRef idx="0"/>
+    <cs:fontRef idx="minor">
+      <a:schemeClr val="tx1"/>
+    </cs:fontRef>
+    <cs:spPr>
+      <a:ln w="9525" cap="flat" cmpd="sng" algn="ctr">
+        <a:solidFill>
+          <a:schemeClr val="tx1">
+            <a:lumMod val="15000"/>
+            <a:lumOff val="85000"/>
+          </a:schemeClr>
+        </a:solidFill>
+        <a:round/>
+      </a:ln>
+    </cs:spPr>
+  </cs:gridlineMajor>
+  <cs:gridlineMinor>
+    <cs:lnRef idx="0"/>
+    <cs:fillRef idx="0"/>
+    <cs:effectRef idx="0"/>
+    <cs:fontRef idx="minor">
+      <a:schemeClr val="tx1"/>
+    </cs:fontRef>
+    <cs:spPr>
+      <a:ln w="9525" cap="flat" cmpd="sng" algn="ctr">
+        <a:solidFill>
+          <a:schemeClr val="tx1">
+            <a:lumMod val="5000"/>
+            <a:lumOff val="95000"/>
+          </a:schemeClr>
+        </a:solidFill>
+        <a:round/>
+      </a:ln>
+    </cs:spPr>
+  </cs:gridlineMinor>
+  <cs:hiLoLine>
+    <cs:lnRef idx="0"/>
+    <cs:fillRef idx="0"/>
+    <cs:effectRef idx="0"/>
+    <cs:fontRef idx="minor">
+      <a:schemeClr val="tx1"/>
+    </cs:fontRef>
+    <cs:spPr>
+      <a:ln w="9525" cap="flat" cmpd="sng" algn="ctr">
+        <a:solidFill>
+          <a:schemeClr val="tx1">
+            <a:lumMod val="50000"/>
+            <a:lumOff val="50000"/>
+          </a:schemeClr>
+        </a:solidFill>
+        <a:round/>
+      </a:ln>
+    </cs:spPr>
+  </cs:hiLoLine>
+  <cs:leaderLine>
+    <cs:lnRef idx="0"/>
+    <cs:fillRef idx="0"/>
+    <cs:effectRef idx="0"/>
+    <cs:fontRef idx="minor">
+      <a:schemeClr val="tx1"/>
+    </cs:fontRef>
+    <cs:spPr>
+      <a:ln w="9525" cap="flat" cmpd="sng" algn="ctr">
+        <a:solidFill>
+          <a:schemeClr val="tx1">
+            <a:lumMod val="35000"/>
+            <a:lumOff val="65000"/>
+          </a:schemeClr>
+        </a:solidFill>
+        <a:round/>
+      </a:ln>
+    </cs:spPr>
+  </cs:leaderLine>
+  <cs:legend>
+    <cs:lnRef idx="0"/>
+    <cs:fillRef idx="0"/>
+    <cs:effectRef idx="0"/>
+    <cs:fontRef idx="minor">
+      <a:schemeClr val="tx1">
+        <a:lumMod val="65000"/>
+        <a:lumOff val="35000"/>
+      </a:schemeClr>
+    </cs:fontRef>
+    <cs:defRPr sz="900" kern="1200"/>
+  </cs:legend>
+  <cs:plotArea mods="allowNoFillOverride allowNoLineOverride">
+    <cs:lnRef idx="0"/>
+    <cs:fillRef idx="0"/>
+    <cs:effectRef idx="0"/>
+    <cs:fontRef idx="minor">
+      <a:schemeClr val="tx1"/>
+    </cs:fontRef>
+  </cs:plotArea>
+  <cs:plotArea3D mods="allowNoFillOverride allowNoLineOverride">
+    <cs:lnRef idx="0"/>
+    <cs:fillRef idx="0"/>
+    <cs:effectRef idx="0"/>
+    <cs:fontRef idx="minor">
+      <a:schemeClr val="tx1"/>
+    </cs:fontRef>
+  </cs:plotArea3D>
+  <cs:seriesAxis>
+    <cs:lnRef idx="0"/>
+    <cs:fillRef idx="0"/>
+    <cs:effectRef idx="0"/>
+    <cs:fontRef idx="minor">
+      <a:schemeClr val="tx1">
+        <a:lumMod val="65000"/>
+        <a:lumOff val="35000"/>
+      </a:schemeClr>
+    </cs:fontRef>
+    <cs:defRPr sz="900" kern="1200"/>
+  </cs:seriesAxis>
+  <cs:seriesLine>
+    <cs:lnRef idx="0"/>
+    <cs:fillRef idx="0"/>
+    <cs:effectRef idx="0"/>
+    <cs:fontRef idx="minor">
+      <a:schemeClr val="tx1"/>
+    </cs:fontRef>
+    <cs:spPr>
+      <a:ln w="9525" cap="flat" cmpd="sng" algn="ctr">
+        <a:solidFill>
+          <a:schemeClr val="tx1">
+            <a:lumMod val="35000"/>
+            <a:lumOff val="65000"/>
+          </a:schemeClr>
+        </a:solidFill>
+        <a:round/>
+      </a:ln>
+    </cs:spPr>
+  </cs:seriesLine>
+  <cs:title>
+    <cs:lnRef idx="0"/>
+    <cs:fillRef idx="0"/>
+    <cs:effectRef idx="0"/>
+    <cs:fontRef idx="minor">
+      <a:schemeClr val="tx1">
+        <a:lumMod val="65000"/>
+        <a:lumOff val="35000"/>
+      </a:schemeClr>
+    </cs:fontRef>
+    <cs:defRPr sz="1400" b="0" kern="1200" spc="0" baseline="0"/>
+  </cs:title>
+  <cs:trendline>
+    <cs:lnRef idx="0">
+      <cs:styleClr val="auto"/>
+    </cs:lnRef>
+    <cs:fillRef idx="0"/>
+    <cs:effectRef idx="0"/>
+    <cs:fontRef idx="minor">
+      <a:schemeClr val="tx1"/>
+    </cs:fontRef>
+    <cs:spPr>
+      <a:ln w="19050" cap="rnd">
+        <a:solidFill>
+          <a:schemeClr val="phClr"/>
+        </a:solidFill>
+        <a:prstDash val="sysDot"/>
+      </a:ln>
+    </cs:spPr>
+  </cs:trendline>
+  <cs:trendlineLabel>
+    <cs:lnRef idx="0"/>
+    <cs:fillRef idx="0"/>
+    <cs:effectRef idx="0"/>
+    <cs:fontRef idx="minor">
+      <a:schemeClr val="tx1">
+        <a:lumMod val="65000"/>
+        <a:lumOff val="35000"/>
+      </a:schemeClr>
+    </cs:fontRef>
+    <cs:defRPr sz="900" kern="1200"/>
+  </cs:trendlineLabel>
+  <cs:upBar>
+    <cs:lnRef idx="0"/>
+    <cs:fillRef idx="0"/>
+    <cs:effectRef idx="0"/>
+    <cs:fontRef idx="minor">
+      <a:schemeClr val="tx1"/>
+    </cs:fontRef>
+    <cs:spPr>
+      <a:solidFill>
+        <a:schemeClr val="lt1"/>
+      </a:solidFill>
+      <a:ln w="9525" cap="flat" cmpd="sng" algn="ctr">
+        <a:solidFill>
+          <a:schemeClr val="tx1">
+            <a:lumMod val="65000"/>
+            <a:lumOff val="35000"/>
+          </a:schemeClr>
+        </a:solidFill>
+        <a:round/>
+      </a:ln>
+    </cs:spPr>
+  </cs:upBar>
+  <cs:valueAxis>
+    <cs:lnRef idx="0"/>
+    <cs:fillRef idx="0"/>
+    <cs:effectRef idx="0"/>
+    <cs:fontRef idx="minor">
+      <a:schemeClr val="tx1">
+        <a:lumMod val="65000"/>
+        <a:lumOff val="35000"/>
+      </a:schemeClr>
+    </cs:fontRef>
+    <cs:defRPr sz="900" kern="1200"/>
+  </cs:valueAxis>
+  <cs:wall>
+    <cs:lnRef idx="0"/>
+    <cs:fillRef idx="0"/>
+    <cs:effectRef idx="0"/>
+    <cs:fontRef idx="minor">
+      <a:schemeClr val="tx1"/>
+    </cs:fontRef>
+    <cs:spPr>
+      <a:noFill/>
+      <a:ln>
+        <a:noFill/>
+      </a:ln>
+    </cs:spPr>
+  </cs:wall>
+</cs:chartStyle>
+</file>
+
+<file path=ppt/drawings/drawing1.xml><?xml version="1.0" encoding="utf-8"?>
+<c:userShapes xmlns:c="http://schemas.openxmlformats.org/drawingml/2006/chart">
+  <cdr:relSizeAnchor xmlns:cdr="http://schemas.openxmlformats.org/drawingml/2006/chartDrawing">
+    <cdr:from>
+      <cdr:x>0.24454</cdr:x>
+      <cdr:y>0.93972</cdr:y>
+    </cdr:from>
+    <cdr:to>
+      <cdr:x>0.75546</cdr:x>
+      <cdr:y>0.99983</cdr:y>
+    </cdr:to>
+    <cdr:sp macro="" textlink="">
+      <cdr:nvSpPr>
+        <cdr:cNvPr id="2" name="テキスト ボックス 1">
+          <a:extLst xmlns:a="http://schemas.openxmlformats.org/drawingml/2006/main">
+            <a:ext uri="{FF2B5EF4-FFF2-40B4-BE49-F238E27FC236}">
+              <a16:creationId xmlns:a16="http://schemas.microsoft.com/office/drawing/2014/main" id="{884E56F4-E670-FB41-B48C-E19AF31741E3}"/>
+            </a:ext>
+          </a:extLst>
+        </cdr:cNvPr>
+        <cdr:cNvSpPr txBox="1"/>
+      </cdr:nvSpPr>
+      <cdr:spPr>
+        <a:xfrm xmlns:a="http://schemas.openxmlformats.org/drawingml/2006/main">
+          <a:off x="1335044" y="5242508"/>
+          <a:ext cx="2789382" cy="335332"/>
+        </a:xfrm>
+        <a:prstGeom xmlns:a="http://schemas.openxmlformats.org/drawingml/2006/main" prst="rect">
+          <a:avLst/>
+        </a:prstGeom>
+      </cdr:spPr>
+      <cdr:txBody>
+        <a:bodyPr xmlns:a="http://schemas.openxmlformats.org/drawingml/2006/main" vertOverflow="clip" wrap="none" rtlCol="0"/>
+        <a:lstStyle xmlns:a="http://schemas.openxmlformats.org/drawingml/2006/main"/>
+        <a:p xmlns:a="http://schemas.openxmlformats.org/drawingml/2006/main">
+          <a:pPr algn="ctr"/>
+          <a:r>
+            <a:rPr lang="en-US" altLang="ja-JP" sz="1100" dirty="0"/>
+            <a:t>Source: Census of Manufactures – 2014</a:t>
+          </a:r>
+          <a:endParaRPr lang="ja-JP" altLang="en-US" sz="1100"/>
+        </a:p>
+      </cdr:txBody>
+    </cdr:sp>
+  </cdr:relSizeAnchor>
+</c:userShapes>
+</file>
+
+<file path=ppt/drawings/drawing2.xml><?xml version="1.0" encoding="utf-8"?>
+<c:userShapes xmlns:c="http://schemas.openxmlformats.org/drawingml/2006/chart">
+  <cdr:relSizeAnchor xmlns:cdr="http://schemas.openxmlformats.org/drawingml/2006/chartDrawing">
+    <cdr:from>
+      <cdr:x>0.24454</cdr:x>
+      <cdr:y>0.93972</cdr:y>
+    </cdr:from>
+    <cdr:to>
+      <cdr:x>0.75546</cdr:x>
+      <cdr:y>0.99983</cdr:y>
+    </cdr:to>
+    <cdr:sp macro="" textlink="">
+      <cdr:nvSpPr>
+        <cdr:cNvPr id="2" name="テキスト ボックス 1">
+          <a:extLst xmlns:a="http://schemas.openxmlformats.org/drawingml/2006/main">
+            <a:ext uri="{FF2B5EF4-FFF2-40B4-BE49-F238E27FC236}">
+              <a16:creationId xmlns:a16="http://schemas.microsoft.com/office/drawing/2014/main" id="{FB42E470-4012-834C-95D3-765B1B6FAAC7}"/>
+            </a:ext>
+          </a:extLst>
+        </cdr:cNvPr>
+        <cdr:cNvSpPr txBox="1"/>
+      </cdr:nvSpPr>
+      <cdr:spPr>
+        <a:xfrm xmlns:a="http://schemas.openxmlformats.org/drawingml/2006/main">
+          <a:off x="1335044" y="5242508"/>
+          <a:ext cx="2789382" cy="335332"/>
+        </a:xfrm>
+        <a:prstGeom xmlns:a="http://schemas.openxmlformats.org/drawingml/2006/main" prst="rect">
+          <a:avLst/>
+        </a:prstGeom>
+      </cdr:spPr>
+      <cdr:txBody>
+        <a:bodyPr xmlns:a="http://schemas.openxmlformats.org/drawingml/2006/main" wrap="none" rtlCol="0"/>
+        <a:lstStyle xmlns:a="http://schemas.openxmlformats.org/drawingml/2006/main">
+          <a:lvl1pPr marL="0" indent="0">
+            <a:defRPr sz="1100">
+              <a:latin typeface="+mn-lt"/>
+              <a:ea typeface="+mn-ea"/>
+              <a:cs typeface="+mn-cs"/>
+            </a:defRPr>
+          </a:lvl1pPr>
+          <a:lvl2pPr marL="457200" indent="0">
+            <a:defRPr sz="1100">
+              <a:latin typeface="+mn-lt"/>
+              <a:ea typeface="+mn-ea"/>
+              <a:cs typeface="+mn-cs"/>
+            </a:defRPr>
+          </a:lvl2pPr>
+          <a:lvl3pPr marL="914400" indent="0">
+            <a:defRPr sz="1100">
+              <a:latin typeface="+mn-lt"/>
+              <a:ea typeface="+mn-ea"/>
+              <a:cs typeface="+mn-cs"/>
+            </a:defRPr>
+          </a:lvl3pPr>
+          <a:lvl4pPr marL="1371600" indent="0">
+            <a:defRPr sz="1100">
+              <a:latin typeface="+mn-lt"/>
+              <a:ea typeface="+mn-ea"/>
+              <a:cs typeface="+mn-cs"/>
+            </a:defRPr>
+          </a:lvl4pPr>
+          <a:lvl5pPr marL="1828800" indent="0">
+            <a:defRPr sz="1100">
+              <a:latin typeface="+mn-lt"/>
+              <a:ea typeface="+mn-ea"/>
+              <a:cs typeface="+mn-cs"/>
+            </a:defRPr>
+          </a:lvl5pPr>
+          <a:lvl6pPr marL="2286000" indent="0">
+            <a:defRPr sz="1100">
+              <a:latin typeface="+mn-lt"/>
+              <a:ea typeface="+mn-ea"/>
+              <a:cs typeface="+mn-cs"/>
+            </a:defRPr>
+          </a:lvl6pPr>
+          <a:lvl7pPr marL="2743200" indent="0">
+            <a:defRPr sz="1100">
+              <a:latin typeface="+mn-lt"/>
+              <a:ea typeface="+mn-ea"/>
+              <a:cs typeface="+mn-cs"/>
+            </a:defRPr>
+          </a:lvl7pPr>
+          <a:lvl8pPr marL="3200400" indent="0">
+            <a:defRPr sz="1100">
+              <a:latin typeface="+mn-lt"/>
+              <a:ea typeface="+mn-ea"/>
+              <a:cs typeface="+mn-cs"/>
+            </a:defRPr>
+          </a:lvl8pPr>
+          <a:lvl9pPr marL="3657600" indent="0">
+            <a:defRPr sz="1100">
+              <a:latin typeface="+mn-lt"/>
+              <a:ea typeface="+mn-ea"/>
+              <a:cs typeface="+mn-cs"/>
+            </a:defRPr>
+          </a:lvl9pPr>
+        </a:lstStyle>
+        <a:p xmlns:a="http://schemas.openxmlformats.org/drawingml/2006/main">
+          <a:pPr algn="ctr"/>
+          <a:r>
+            <a:rPr lang="en-US" altLang="ja-JP" sz="1100" dirty="0"/>
+            <a:t>Source: Census of Manufactures – 2014</a:t>
+          </a:r>
+          <a:endParaRPr lang="ja-JP" altLang="en-US" sz="1100"/>
+        </a:p>
+      </cdr:txBody>
+    </cdr:sp>
+  </cdr:relSizeAnchor>
+</c:userShapes>
 </file>
 
 <file path=ppt/slideLayouts/slideLayout1.xml><?xml version="1.0" encoding="utf-8"?>
@@ -3569,10 +5783,10 @@
       </p:grpSpPr>
       <p:sp>
         <p:nvSpPr>
-          <p:cNvPr id="27" name="Rectangle 26">
-            <a:extLst>
-              <a:ext uri="{FF2B5EF4-FFF2-40B4-BE49-F238E27FC236}">
-                <a16:creationId xmlns:a16="http://schemas.microsoft.com/office/drawing/2014/main" id="{35555856-9970-4BC3-9AA9-6A917F53AFBD}"/>
+          <p:cNvPr id="36" name="Rectangle 35">
+            <a:extLst>
+              <a:ext uri="{FF2B5EF4-FFF2-40B4-BE49-F238E27FC236}">
+                <a16:creationId xmlns:a16="http://schemas.microsoft.com/office/drawing/2014/main" id="{029DE7B6-DC7C-4BA1-B406-EDDA0C0A31C4}"/>
               </a:ext>
               <a:ext uri="{C183D7F6-B498-43B3-948B-1728B52AA6E4}">
                 <adec:decorative xmlns:adec="http://schemas.microsoft.com/office/drawing/2017/decorative" val="1"/>
@@ -3592,38 +5806,15 @@
         </p:nvSpPr>
         <p:spPr>
           <a:xfrm>
-            <a:off x="5769972" y="0"/>
-            <a:ext cx="6421721" cy="6858000"/>
+            <a:off x="4654296" y="-2"/>
+            <a:ext cx="7537704" cy="6858002"/>
           </a:xfrm>
           <a:prstGeom prst="rect">
             <a:avLst/>
           </a:prstGeom>
-          <a:gradFill>
-            <a:gsLst>
-              <a:gs pos="0">
-                <a:schemeClr val="accent1">
-                  <a:lumMod val="100000"/>
-                  <a:alpha val="82000"/>
-                </a:schemeClr>
-              </a:gs>
-              <a:gs pos="25000">
-                <a:schemeClr val="accent1">
-                  <a:alpha val="60000"/>
-                </a:schemeClr>
-              </a:gs>
-              <a:gs pos="94000">
-                <a:schemeClr val="bg2">
-                  <a:lumMod val="75000"/>
-                </a:schemeClr>
-              </a:gs>
-              <a:gs pos="100000">
-                <a:schemeClr val="bg2">
-                  <a:lumMod val="75000"/>
-                </a:schemeClr>
-              </a:gs>
-            </a:gsLst>
-            <a:lin ang="4200000" scaled="0"/>
-          </a:gradFill>
+          <a:solidFill>
+            <a:schemeClr val="accent1"/>
+          </a:solidFill>
           <a:ln>
             <a:noFill/>
           </a:ln>
@@ -3648,191 +5839,243 @@
           <a:bodyPr rtlCol="0" anchor="ctr"/>
           <a:lstStyle/>
           <a:p>
-            <a:pPr algn="ctr"/>
-            <a:endParaRPr lang="en-US"/>
+            <a:pPr marL="0" marR="0" lvl="0" indent="0" algn="ctr" defTabSz="914400" rtl="0" eaLnBrk="1" fontAlgn="auto" latinLnBrk="0" hangingPunct="1">
+              <a:lnSpc>
+                <a:spcPct val="100000"/>
+              </a:lnSpc>
+              <a:spcBef>
+                <a:spcPts val="0"/>
+              </a:spcBef>
+              <a:spcAft>
+                <a:spcPts val="0"/>
+              </a:spcAft>
+              <a:buClrTx/>
+              <a:buSzTx/>
+              <a:buFontTx/>
+              <a:buNone/>
+              <a:tabLst/>
+              <a:defRPr/>
+            </a:pPr>
+            <a:endParaRPr kumimoji="0" lang="en-US" sz="1800" b="0" i="0" u="none" strike="noStrike" kern="1200" cap="none" spc="0" normalizeH="0" baseline="0" noProof="0">
+              <a:ln>
+                <a:noFill/>
+              </a:ln>
+              <a:solidFill>
+                <a:prstClr val="white"/>
+              </a:solidFill>
+              <a:effectLst/>
+              <a:uLnTx/>
+              <a:uFillTx/>
+              <a:latin typeface="Calibri" panose="020F0502020204030204"/>
+              <a:ea typeface="+mn-ea"/>
+              <a:cs typeface="+mn-cs"/>
+            </a:endParaRPr>
+          </a:p>
+        </p:txBody>
+      </p:sp>
+      <p:sp>
+        <p:nvSpPr>
+          <p:cNvPr id="2" name="タイトル 1">
+            <a:extLst>
+              <a:ext uri="{FF2B5EF4-FFF2-40B4-BE49-F238E27FC236}">
+                <a16:creationId xmlns:a16="http://schemas.microsoft.com/office/drawing/2014/main" id="{942ADE43-D179-8145-9193-F92DF2D09F75}"/>
+              </a:ext>
+            </a:extLst>
+          </p:cNvPr>
+          <p:cNvSpPr>
+            <a:spLocks noGrp="1"/>
+          </p:cNvSpPr>
+          <p:nvPr>
+            <p:ph type="ctrTitle"/>
+          </p:nvPr>
+        </p:nvSpPr>
+        <p:spPr>
+          <a:xfrm>
+            <a:off x="5189620" y="1306071"/>
+            <a:ext cx="5478379" cy="2663407"/>
+          </a:xfrm>
+        </p:spPr>
+        <p:txBody>
+          <a:bodyPr>
+            <a:normAutofit/>
+          </a:bodyPr>
+          <a:lstStyle/>
+          <a:p>
+            <a:pPr algn="l"/>
+            <a:r>
+              <a:rPr kumimoji="1" lang="en-US" altLang="ja-JP" sz="5400">
+                <a:solidFill>
+                  <a:srgbClr val="FFFFFF"/>
+                </a:solidFill>
+              </a:rPr>
+              <a:t>The industry of Ube-shi</a:t>
+            </a:r>
+            <a:r>
+              <a:rPr lang="en-US" altLang="ja-JP" sz="5400">
+                <a:solidFill>
+                  <a:srgbClr val="FFFFFF"/>
+                </a:solidFill>
+              </a:rPr>
+              <a:t>, Yamaguchi pref.</a:t>
+            </a:r>
+            <a:endParaRPr kumimoji="1" lang="ja-JP" altLang="en-US" sz="5400">
+              <a:solidFill>
+                <a:srgbClr val="FFFFFF"/>
+              </a:solidFill>
+            </a:endParaRPr>
+          </a:p>
+        </p:txBody>
+      </p:sp>
+      <p:sp>
+        <p:nvSpPr>
+          <p:cNvPr id="3" name="字幕 2">
+            <a:extLst>
+              <a:ext uri="{FF2B5EF4-FFF2-40B4-BE49-F238E27FC236}">
+                <a16:creationId xmlns:a16="http://schemas.microsoft.com/office/drawing/2014/main" id="{0BEAC767-6CB6-1B43-8A5D-0D65F764107C}"/>
+              </a:ext>
+            </a:extLst>
+          </p:cNvPr>
+          <p:cNvSpPr>
+            <a:spLocks noGrp="1"/>
+          </p:cNvSpPr>
+          <p:nvPr>
+            <p:ph type="subTitle" idx="1"/>
+          </p:nvPr>
+        </p:nvSpPr>
+        <p:spPr>
+          <a:xfrm>
+            <a:off x="5189620" y="4106004"/>
+            <a:ext cx="5478380" cy="1860883"/>
+          </a:xfrm>
+        </p:spPr>
+        <p:txBody>
+          <a:bodyPr>
+            <a:normAutofit/>
+          </a:bodyPr>
+          <a:lstStyle/>
+          <a:p>
+            <a:pPr marL="342900" indent="-342900" algn="l">
+              <a:buFont typeface="Arial" panose="020B0604020202020204" pitchFamily="34" charset="0"/>
+              <a:buChar char="•"/>
+            </a:pPr>
+            <a:r>
+              <a:rPr kumimoji="1" lang="en-US" altLang="ja-JP">
+                <a:solidFill>
+                  <a:srgbClr val="FFFFFF"/>
+                </a:solidFill>
+              </a:rPr>
+              <a:t>AAA BBB</a:t>
+            </a:r>
+          </a:p>
+          <a:p>
+            <a:pPr marL="342900" indent="-342900" algn="l">
+              <a:buFont typeface="Arial" panose="020B0604020202020204" pitchFamily="34" charset="0"/>
+              <a:buChar char="•"/>
+            </a:pPr>
+            <a:r>
+              <a:rPr lang="en-US" altLang="ja-JP">
+                <a:solidFill>
+                  <a:srgbClr val="FFFFFF"/>
+                </a:solidFill>
+              </a:rPr>
+              <a:t>CCC DDD</a:t>
+            </a:r>
+          </a:p>
+          <a:p>
+            <a:pPr marL="342900" indent="-342900" algn="l">
+              <a:buFont typeface="Arial" panose="020B0604020202020204" pitchFamily="34" charset="0"/>
+              <a:buChar char="•"/>
+            </a:pPr>
+            <a:r>
+              <a:rPr kumimoji="1" lang="en-US" altLang="ja-JP">
+                <a:solidFill>
+                  <a:srgbClr val="FFFFFF"/>
+                </a:solidFill>
+              </a:rPr>
+              <a:t>EEE FFF</a:t>
+            </a:r>
+            <a:endParaRPr kumimoji="1" lang="ja-JP" altLang="en-US">
+              <a:solidFill>
+                <a:srgbClr val="FFFFFF"/>
+              </a:solidFill>
+            </a:endParaRPr>
           </a:p>
         </p:txBody>
       </p:sp>
       <p:pic>
         <p:nvPicPr>
-          <p:cNvPr id="29" name="Picture 28">
-            <a:extLst>
-              <a:ext uri="{FF2B5EF4-FFF2-40B4-BE49-F238E27FC236}">
-                <a16:creationId xmlns:a16="http://schemas.microsoft.com/office/drawing/2014/main" id="{7F487851-BFAF-46D8-A1ED-50CAD6E46F59}"/>
-              </a:ext>
-              <a:ext uri="{C183D7F6-B498-43B3-948B-1728B52AA6E4}">
-                <adec:decorative xmlns:adec="http://schemas.microsoft.com/office/drawing/2017/decorative" val="1"/>
+          <p:cNvPr id="5" name="図 4">
+            <a:extLst>
+              <a:ext uri="{FF2B5EF4-FFF2-40B4-BE49-F238E27FC236}">
+                <a16:creationId xmlns:a16="http://schemas.microsoft.com/office/drawing/2014/main" id="{A9DAB2D0-6B92-994E-9398-1EFDA8039B39}"/>
               </a:ext>
             </a:extLst>
           </p:cNvPr>
           <p:cNvPicPr>
-            <a:picLocks noGrp="1" noRot="1" noChangeAspect="1" noMove="1" noResize="1" noEditPoints="1" noAdjustHandles="1" noChangeArrowheads="1" noChangeShapeType="1" noCrop="1"/>
+            <a:picLocks noChangeAspect="1"/>
           </p:cNvPicPr>
-          <p:nvPr>
-            <p:extLst>
-              <p:ext uri="{386F3935-93C4-4BCD-93E2-E3B085C9AB24}">
-                <p16:designElem xmlns:p16="http://schemas.microsoft.com/office/powerpoint/2015/main" val="1"/>
-              </p:ext>
-            </p:extLst>
-          </p:nvPr>
+          <p:nvPr/>
         </p:nvPicPr>
         <p:blipFill>
-          <a:blip r:embed="rId2">
-            <a:extLst>
-              <a:ext uri="{28A0092B-C50C-407E-A947-70E740481C1C}">
-                <a14:useLocalDpi xmlns:a14="http://schemas.microsoft.com/office/drawing/2010/main" val="0"/>
-              </a:ext>
-            </a:extLst>
-          </a:blip>
+          <a:blip r:embed="rId2"/>
           <a:stretch>
             <a:fillRect/>
           </a:stretch>
         </p:blipFill>
         <p:spPr>
-          <a:xfrm flipH="1">
-            <a:off x="0" y="0"/>
-            <a:ext cx="12192000" cy="6858000"/>
+          <a:xfrm>
+            <a:off x="853649" y="3019526"/>
+            <a:ext cx="2967205" cy="818947"/>
           </a:xfrm>
           <a:prstGeom prst="rect">
             <a:avLst/>
           </a:prstGeom>
         </p:spPr>
       </p:pic>
-      <p:sp>
-        <p:nvSpPr>
-          <p:cNvPr id="2" name="タイトル 1">
-            <a:extLst>
-              <a:ext uri="{FF2B5EF4-FFF2-40B4-BE49-F238E27FC236}">
-                <a16:creationId xmlns:a16="http://schemas.microsoft.com/office/drawing/2014/main" id="{942ADE43-D179-8145-9193-F92DF2D09F75}"/>
-              </a:ext>
-            </a:extLst>
-          </p:cNvPr>
-          <p:cNvSpPr>
-            <a:spLocks noGrp="1"/>
-          </p:cNvSpPr>
-          <p:nvPr>
-            <p:ph type="ctrTitle"/>
-          </p:nvPr>
-        </p:nvSpPr>
-        <p:spPr>
-          <a:xfrm>
-            <a:off x="804484" y="4267832"/>
-            <a:ext cx="4805996" cy="1297115"/>
-          </a:xfrm>
-        </p:spPr>
-        <p:txBody>
-          <a:bodyPr anchor="t">
-            <a:normAutofit/>
-          </a:bodyPr>
-          <a:lstStyle/>
-          <a:p>
-            <a:pPr algn="l"/>
-            <a:r>
-              <a:rPr kumimoji="1" lang="en-US" altLang="ja-JP" sz="4100" dirty="0">
-                <a:solidFill>
-                  <a:srgbClr val="000000"/>
-                </a:solidFill>
-              </a:rPr>
-              <a:t>The industry of Ube-shi</a:t>
-            </a:r>
-            <a:r>
-              <a:rPr lang="en-US" altLang="ja-JP" sz="4100" dirty="0">
-                <a:solidFill>
-                  <a:srgbClr val="000000"/>
-                </a:solidFill>
-              </a:rPr>
-              <a:t>, Yamaguchi pref.</a:t>
-            </a:r>
-            <a:endParaRPr kumimoji="1" lang="ja-JP" altLang="en-US" sz="4100">
-              <a:solidFill>
-                <a:srgbClr val="000000"/>
-              </a:solidFill>
-            </a:endParaRPr>
-          </a:p>
-        </p:txBody>
-      </p:sp>
-      <p:sp>
-        <p:nvSpPr>
-          <p:cNvPr id="3" name="字幕 2">
-            <a:extLst>
-              <a:ext uri="{FF2B5EF4-FFF2-40B4-BE49-F238E27FC236}">
-                <a16:creationId xmlns:a16="http://schemas.microsoft.com/office/drawing/2014/main" id="{0BEAC767-6CB6-1B43-8A5D-0D65F764107C}"/>
-              </a:ext>
-            </a:extLst>
-          </p:cNvPr>
-          <p:cNvSpPr>
-            <a:spLocks noGrp="1"/>
-          </p:cNvSpPr>
-          <p:nvPr>
-            <p:ph type="subTitle" idx="1"/>
-          </p:nvPr>
-        </p:nvSpPr>
-        <p:spPr>
-          <a:xfrm>
-            <a:off x="804788" y="3428999"/>
-            <a:ext cx="4805691" cy="838831"/>
-          </a:xfrm>
-        </p:spPr>
-        <p:txBody>
-          <a:bodyPr anchor="b">
-            <a:normAutofit/>
-          </a:bodyPr>
-          <a:lstStyle/>
-          <a:p>
-            <a:pPr marL="342900" indent="-342900" algn="l">
-              <a:buFont typeface="Arial" panose="020B0604020202020204" pitchFamily="34" charset="0"/>
-              <a:buChar char="•"/>
-            </a:pPr>
-            <a:r>
-              <a:rPr kumimoji="1" lang="en-US" altLang="ja-JP" sz="1100">
-                <a:solidFill>
-                  <a:srgbClr val="000000"/>
-                </a:solidFill>
-              </a:rPr>
-              <a:t>AAA BBB</a:t>
-            </a:r>
-          </a:p>
-          <a:p>
-            <a:pPr marL="342900" indent="-342900" algn="l">
-              <a:buFont typeface="Arial" panose="020B0604020202020204" pitchFamily="34" charset="0"/>
-              <a:buChar char="•"/>
-            </a:pPr>
-            <a:r>
-              <a:rPr lang="en-US" altLang="ja-JP" sz="1100">
-                <a:solidFill>
-                  <a:srgbClr val="000000"/>
-                </a:solidFill>
-              </a:rPr>
-              <a:t>CCC DDD</a:t>
-            </a:r>
-          </a:p>
-          <a:p>
-            <a:pPr marL="342900" indent="-342900" algn="l">
-              <a:buFont typeface="Arial" panose="020B0604020202020204" pitchFamily="34" charset="0"/>
-              <a:buChar char="•"/>
-            </a:pPr>
-            <a:r>
-              <a:rPr kumimoji="1" lang="en-US" altLang="ja-JP" sz="1100">
-                <a:solidFill>
-                  <a:srgbClr val="000000"/>
-                </a:solidFill>
-              </a:rPr>
-              <a:t>EEE FFF</a:t>
-            </a:r>
-            <a:endParaRPr kumimoji="1" lang="ja-JP" altLang="en-US" sz="1100">
-              <a:solidFill>
-                <a:srgbClr val="000000"/>
-              </a:solidFill>
-            </a:endParaRPr>
-          </a:p>
-        </p:txBody>
-      </p:sp>
-      <p:sp>
-        <p:nvSpPr>
-          <p:cNvPr id="31" name="Freeform 50">
-            <a:extLst>
-              <a:ext uri="{FF2B5EF4-FFF2-40B4-BE49-F238E27FC236}">
-                <a16:creationId xmlns:a16="http://schemas.microsoft.com/office/drawing/2014/main" id="{13722DD7-BA73-4776-93A3-94491FEF7260}"/>
+    </p:spTree>
+    <p:extLst>
+      <p:ext uri="{BB962C8B-B14F-4D97-AF65-F5344CB8AC3E}">
+        <p14:creationId xmlns:p14="http://schemas.microsoft.com/office/powerpoint/2010/main" val="2954630195"/>
+      </p:ext>
+    </p:extLst>
+  </p:cSld>
+  <p:clrMapOvr>
+    <a:masterClrMapping/>
+  </p:clrMapOvr>
+</p:sld>
+</file>
+
+<file path=ppt/slides/slide2.xml><?xml version="1.0" encoding="utf-8"?>
+<p:sld xmlns:a="http://schemas.openxmlformats.org/drawingml/2006/main" xmlns:r="http://schemas.openxmlformats.org/officeDocument/2006/relationships" xmlns:p="http://schemas.openxmlformats.org/presentationml/2006/main">
+  <p:cSld>
+    <p:bg>
+      <p:bgPr>
+        <a:solidFill>
+          <a:schemeClr val="bg1"/>
+        </a:solidFill>
+        <a:effectLst/>
+      </p:bgPr>
+    </p:bg>
+    <p:spTree>
+      <p:nvGrpSpPr>
+        <p:cNvPr id="1" name=""/>
+        <p:cNvGrpSpPr/>
+        <p:nvPr/>
+      </p:nvGrpSpPr>
+      <p:grpSpPr>
+        <a:xfrm>
+          <a:off x="0" y="0"/>
+          <a:ext cx="0" cy="0"/>
+          <a:chOff x="0" y="0"/>
+          <a:chExt cx="0" cy="0"/>
+        </a:xfrm>
+      </p:grpSpPr>
+      <p:sp>
+        <p:nvSpPr>
+          <p:cNvPr id="9" name="Rectangle 8">
+            <a:extLst>
+              <a:ext uri="{FF2B5EF4-FFF2-40B4-BE49-F238E27FC236}">
+                <a16:creationId xmlns:a16="http://schemas.microsoft.com/office/drawing/2014/main" id="{4845A0EE-C4C8-4AE1-B3C6-1261368AC036}"/>
               </a:ext>
               <a:ext uri="{C183D7F6-B498-43B3-948B-1728B52AA6E4}">
                 <adec:decorative xmlns:adec="http://schemas.microsoft.com/office/drawing/2017/decorative" val="1"/>
@@ -3852,150 +6095,17 @@
         </p:nvSpPr>
         <p:spPr>
           <a:xfrm>
-            <a:off x="6727121" y="581159"/>
-            <a:ext cx="5464879" cy="6276841"/>
+            <a:off x="0" y="0"/>
+            <a:ext cx="5468548" cy="6858000"/>
           </a:xfrm>
-          <a:custGeom>
+          <a:prstGeom prst="rect">
             <a:avLst/>
-            <a:gdLst>
-              <a:gd name="connsiteX0" fmla="*/ 3299930 w 5464879"/>
-              <a:gd name="connsiteY0" fmla="*/ 0 h 6276841"/>
-              <a:gd name="connsiteX1" fmla="*/ 5398992 w 5464879"/>
-              <a:gd name="connsiteY1" fmla="*/ 753544 h 6276841"/>
-              <a:gd name="connsiteX2" fmla="*/ 5464879 w 5464879"/>
-              <a:gd name="connsiteY2" fmla="*/ 813426 h 6276841"/>
-              <a:gd name="connsiteX3" fmla="*/ 5464879 w 5464879"/>
-              <a:gd name="connsiteY3" fmla="*/ 5786434 h 6276841"/>
-              <a:gd name="connsiteX4" fmla="*/ 5398992 w 5464879"/>
-              <a:gd name="connsiteY4" fmla="*/ 5846317 h 6276841"/>
-              <a:gd name="connsiteX5" fmla="*/ 4872873 w 5464879"/>
-              <a:gd name="connsiteY5" fmla="*/ 6201577 h 6276841"/>
-              <a:gd name="connsiteX6" fmla="*/ 4716632 w 5464879"/>
-              <a:gd name="connsiteY6" fmla="*/ 6276841 h 6276841"/>
-              <a:gd name="connsiteX7" fmla="*/ 1883227 w 5464879"/>
-              <a:gd name="connsiteY7" fmla="*/ 6276841 h 6276841"/>
-              <a:gd name="connsiteX8" fmla="*/ 1726987 w 5464879"/>
-              <a:gd name="connsiteY8" fmla="*/ 6201577 h 6276841"/>
-              <a:gd name="connsiteX9" fmla="*/ 0 w 5464879"/>
-              <a:gd name="connsiteY9" fmla="*/ 3299930 h 6276841"/>
-              <a:gd name="connsiteX10" fmla="*/ 3299930 w 5464879"/>
-              <a:gd name="connsiteY10" fmla="*/ 0 h 6276841"/>
-            </a:gdLst>
-            <a:ahLst/>
-            <a:cxnLst>
-              <a:cxn ang="0">
-                <a:pos x="connsiteX0" y="connsiteY0"/>
-              </a:cxn>
-              <a:cxn ang="0">
-                <a:pos x="connsiteX1" y="connsiteY1"/>
-              </a:cxn>
-              <a:cxn ang="0">
-                <a:pos x="connsiteX2" y="connsiteY2"/>
-              </a:cxn>
-              <a:cxn ang="0">
-                <a:pos x="connsiteX3" y="connsiteY3"/>
-              </a:cxn>
-              <a:cxn ang="0">
-                <a:pos x="connsiteX4" y="connsiteY4"/>
-              </a:cxn>
-              <a:cxn ang="0">
-                <a:pos x="connsiteX5" y="connsiteY5"/>
-              </a:cxn>
-              <a:cxn ang="0">
-                <a:pos x="connsiteX6" y="connsiteY6"/>
-              </a:cxn>
-              <a:cxn ang="0">
-                <a:pos x="connsiteX7" y="connsiteY7"/>
-              </a:cxn>
-              <a:cxn ang="0">
-                <a:pos x="connsiteX8" y="connsiteY8"/>
-              </a:cxn>
-              <a:cxn ang="0">
-                <a:pos x="connsiteX9" y="connsiteY9"/>
-              </a:cxn>
-              <a:cxn ang="0">
-                <a:pos x="connsiteX10" y="connsiteY10"/>
-              </a:cxn>
-            </a:cxnLst>
-            <a:rect l="l" t="t" r="r" b="b"/>
-            <a:pathLst>
-              <a:path w="5464879" h="6276841">
-                <a:moveTo>
-                  <a:pt x="3299930" y="0"/>
-                </a:moveTo>
-                <a:cubicBezTo>
-                  <a:pt x="4097274" y="0"/>
-                  <a:pt x="4828569" y="282789"/>
-                  <a:pt x="5398992" y="753544"/>
-                </a:cubicBezTo>
-                <a:lnTo>
-                  <a:pt x="5464879" y="813426"/>
-                </a:lnTo>
-                <a:lnTo>
-                  <a:pt x="5464879" y="5786434"/>
-                </a:lnTo>
-                <a:lnTo>
-                  <a:pt x="5398992" y="5846317"/>
-                </a:lnTo>
-                <a:cubicBezTo>
-                  <a:pt x="5236014" y="5980818"/>
-                  <a:pt x="5059904" y="6099975"/>
-                  <a:pt x="4872873" y="6201577"/>
-                </a:cubicBezTo>
-                <a:lnTo>
-                  <a:pt x="4716632" y="6276841"/>
-                </a:lnTo>
-                <a:lnTo>
-                  <a:pt x="1883227" y="6276841"/>
-                </a:lnTo>
-                <a:lnTo>
-                  <a:pt x="1726987" y="6201577"/>
-                </a:lnTo>
-                <a:cubicBezTo>
-                  <a:pt x="698316" y="5642769"/>
-                  <a:pt x="0" y="4552900"/>
-                  <a:pt x="0" y="3299930"/>
-                </a:cubicBezTo>
-                <a:cubicBezTo>
-                  <a:pt x="0" y="1477429"/>
-                  <a:pt x="1477429" y="0"/>
-                  <a:pt x="3299930" y="0"/>
-                </a:cubicBezTo>
-                <a:close/>
-              </a:path>
-            </a:pathLst>
-          </a:custGeom>
+          </a:prstGeom>
           <a:solidFill>
-            <a:srgbClr val="FFFFFF"/>
+            <a:schemeClr val="accent1"/>
           </a:solidFill>
           <a:ln>
-            <a:gradFill>
-              <a:gsLst>
-                <a:gs pos="0">
-                  <a:schemeClr val="accent1">
-                    <a:lumMod val="40000"/>
-                    <a:lumOff val="60000"/>
-                  </a:schemeClr>
-                </a:gs>
-                <a:gs pos="23000">
-                  <a:schemeClr val="accent1">
-                    <a:lumMod val="45000"/>
-                    <a:lumOff val="55000"/>
-                  </a:schemeClr>
-                </a:gs>
-                <a:gs pos="83000">
-                  <a:schemeClr val="bg2">
-                    <a:lumMod val="75000"/>
-                  </a:schemeClr>
-                </a:gs>
-                <a:gs pos="100000">
-                  <a:schemeClr val="bg2">
-                    <a:lumMod val="75000"/>
-                  </a:schemeClr>
-                </a:gs>
-              </a:gsLst>
-              <a:lin ang="5400000" scaled="1"/>
-            </a:gradFill>
+            <a:noFill/>
           </a:ln>
         </p:spPr>
         <p:style>
@@ -4015,50 +6125,265 @@
           </a:fontRef>
         </p:style>
         <p:txBody>
-          <a:bodyPr wrap="square" rtlCol="0" anchor="ctr">
-            <a:noAutofit/>
+          <a:bodyPr rtlCol="0" anchor="ctr"/>
+          <a:lstStyle/>
+          <a:p>
+            <a:pPr algn="ctr"/>
+            <a:endParaRPr lang="en-US"/>
+          </a:p>
+        </p:txBody>
+      </p:sp>
+      <p:sp>
+        <p:nvSpPr>
+          <p:cNvPr id="2" name="タイトル 1">
+            <a:extLst>
+              <a:ext uri="{FF2B5EF4-FFF2-40B4-BE49-F238E27FC236}">
+                <a16:creationId xmlns:a16="http://schemas.microsoft.com/office/drawing/2014/main" id="{157D85E4-2D8B-4C49-B5D3-EF00FDBDAA2D}"/>
+              </a:ext>
+            </a:extLst>
+          </p:cNvPr>
+          <p:cNvSpPr>
+            <a:spLocks noGrp="1"/>
+          </p:cNvSpPr>
+          <p:nvPr>
+            <p:ph type="title"/>
+          </p:nvPr>
+        </p:nvSpPr>
+        <p:spPr>
+          <a:xfrm>
+            <a:off x="621629" y="640080"/>
+            <a:ext cx="4225290" cy="5578816"/>
+          </a:xfrm>
+        </p:spPr>
+        <p:txBody>
+          <a:bodyPr vert="horz" lIns="91440" tIns="45720" rIns="91440" bIns="45720" rtlCol="0" anchor="ctr">
+            <a:normAutofit/>
           </a:bodyPr>
           <a:lstStyle/>
           <a:p>
             <a:pPr algn="ctr"/>
-            <a:endParaRPr lang="en-US"/>
-          </a:p>
-        </p:txBody>
-      </p:sp>
-      <p:pic>
-        <p:nvPicPr>
-          <p:cNvPr id="5" name="図 4">
-            <a:extLst>
-              <a:ext uri="{FF2B5EF4-FFF2-40B4-BE49-F238E27FC236}">
-                <a16:creationId xmlns:a16="http://schemas.microsoft.com/office/drawing/2014/main" id="{A9DAB2D0-6B92-994E-9398-1EFDA8039B39}"/>
-              </a:ext>
-            </a:extLst>
-          </p:cNvPr>
-          <p:cNvPicPr>
-            <a:picLocks noChangeAspect="1"/>
-          </p:cNvPicPr>
-          <p:nvPr/>
-        </p:nvPicPr>
-        <p:blipFill>
-          <a:blip r:embed="rId3"/>
-          <a:stretch>
-            <a:fillRect/>
-          </a:stretch>
-        </p:blipFill>
+            <a:r>
+              <a:rPr kumimoji="1" lang="en-US" altLang="ja-JP" sz="4400" kern="1200" dirty="0">
+                <a:solidFill>
+                  <a:srgbClr val="FFFFFF"/>
+                </a:solidFill>
+                <a:latin typeface="+mj-lt"/>
+                <a:ea typeface="+mj-ea"/>
+                <a:cs typeface="+mj-cs"/>
+              </a:rPr>
+              <a:t>Industry structure of Ube-shi</a:t>
+            </a:r>
+          </a:p>
+        </p:txBody>
+      </p:sp>
+      <p:graphicFrame>
+        <p:nvGraphicFramePr>
+          <p:cNvPr id="4" name="グラフ 3">
+            <a:extLst>
+              <a:ext uri="{FF2B5EF4-FFF2-40B4-BE49-F238E27FC236}">
+                <a16:creationId xmlns:a16="http://schemas.microsoft.com/office/drawing/2014/main" id="{95D75712-2364-A04D-BEF5-605F026A2A36}"/>
+              </a:ext>
+            </a:extLst>
+          </p:cNvPr>
+          <p:cNvGraphicFramePr>
+            <a:graphicFrameLocks/>
+          </p:cNvGraphicFramePr>
+          <p:nvPr>
+            <p:extLst>
+              <p:ext uri="{D42A27DB-BD31-4B8C-83A1-F6EECF244321}">
+                <p14:modId xmlns:p14="http://schemas.microsoft.com/office/powerpoint/2010/main" val="930595421"/>
+              </p:ext>
+            </p:extLst>
+          </p:nvPr>
+        </p:nvGraphicFramePr>
+        <p:xfrm>
+          <a:off x="6096000" y="640080"/>
+          <a:ext cx="5459470" cy="5578816"/>
+        </p:xfrm>
+        <a:graphic>
+          <a:graphicData uri="http://schemas.openxmlformats.org/drawingml/2006/chart">
+            <c:chart xmlns:c="http://schemas.openxmlformats.org/drawingml/2006/chart" xmlns:r="http://schemas.openxmlformats.org/officeDocument/2006/relationships" r:id="rId2"/>
+          </a:graphicData>
+        </a:graphic>
+      </p:graphicFrame>
+    </p:spTree>
+    <p:extLst>
+      <p:ext uri="{BB962C8B-B14F-4D97-AF65-F5344CB8AC3E}">
+        <p14:creationId xmlns:p14="http://schemas.microsoft.com/office/powerpoint/2010/main" val="658695309"/>
+      </p:ext>
+    </p:extLst>
+  </p:cSld>
+  <p:clrMapOvr>
+    <a:masterClrMapping/>
+  </p:clrMapOvr>
+</p:sld>
+</file>
+
+<file path=ppt/slides/slide3.xml><?xml version="1.0" encoding="utf-8"?>
+<p:sld xmlns:a="http://schemas.openxmlformats.org/drawingml/2006/main" xmlns:r="http://schemas.openxmlformats.org/officeDocument/2006/relationships" xmlns:p="http://schemas.openxmlformats.org/presentationml/2006/main">
+  <p:cSld>
+    <p:bg>
+      <p:bgPr>
+        <a:solidFill>
+          <a:schemeClr val="bg1"/>
+        </a:solidFill>
+        <a:effectLst/>
+      </p:bgPr>
+    </p:bg>
+    <p:spTree>
+      <p:nvGrpSpPr>
+        <p:cNvPr id="1" name=""/>
+        <p:cNvGrpSpPr/>
+        <p:nvPr/>
+      </p:nvGrpSpPr>
+      <p:grpSpPr>
+        <a:xfrm>
+          <a:off x="0" y="0"/>
+          <a:ext cx="0" cy="0"/>
+          <a:chOff x="0" y="0"/>
+          <a:chExt cx="0" cy="0"/>
+        </a:xfrm>
+      </p:grpSpPr>
+      <p:sp>
+        <p:nvSpPr>
+          <p:cNvPr id="10" name="Rectangle 9">
+            <a:extLst>
+              <a:ext uri="{FF2B5EF4-FFF2-40B4-BE49-F238E27FC236}">
+                <a16:creationId xmlns:a16="http://schemas.microsoft.com/office/drawing/2014/main" id="{4845A0EE-C4C8-4AE1-B3C6-1261368AC036}"/>
+              </a:ext>
+              <a:ext uri="{C183D7F6-B498-43B3-948B-1728B52AA6E4}">
+                <adec:decorative xmlns:adec="http://schemas.microsoft.com/office/drawing/2017/decorative" val="1"/>
+              </a:ext>
+            </a:extLst>
+          </p:cNvPr>
+          <p:cNvSpPr>
+            <a:spLocks noGrp="1" noRot="1" noChangeAspect="1" noMove="1" noResize="1" noEditPoints="1" noAdjustHandles="1" noChangeArrowheads="1" noChangeShapeType="1" noTextEdit="1"/>
+          </p:cNvSpPr>
+          <p:nvPr>
+            <p:extLst>
+              <p:ext uri="{386F3935-93C4-4BCD-93E2-E3B085C9AB24}">
+                <p16:designElem xmlns:p16="http://schemas.microsoft.com/office/powerpoint/2015/main" val="1"/>
+              </p:ext>
+            </p:extLst>
+          </p:nvPr>
+        </p:nvSpPr>
         <p:spPr>
           <a:xfrm>
-            <a:off x="7709770" y="3314637"/>
-            <a:ext cx="4141760" cy="1143125"/>
+            <a:off x="0" y="0"/>
+            <a:ext cx="5468548" cy="6858000"/>
           </a:xfrm>
           <a:prstGeom prst="rect">
             <a:avLst/>
           </a:prstGeom>
+          <a:solidFill>
+            <a:schemeClr val="accent1"/>
+          </a:solidFill>
+          <a:ln>
+            <a:noFill/>
+          </a:ln>
         </p:spPr>
-      </p:pic>
+        <p:style>
+          <a:lnRef idx="2">
+            <a:schemeClr val="accent1">
+              <a:shade val="50000"/>
+            </a:schemeClr>
+          </a:lnRef>
+          <a:fillRef idx="1">
+            <a:schemeClr val="accent1"/>
+          </a:fillRef>
+          <a:effectRef idx="0">
+            <a:schemeClr val="accent1"/>
+          </a:effectRef>
+          <a:fontRef idx="minor">
+            <a:schemeClr val="lt1"/>
+          </a:fontRef>
+        </p:style>
+        <p:txBody>
+          <a:bodyPr rtlCol="0" anchor="ctr"/>
+          <a:lstStyle/>
+          <a:p>
+            <a:pPr algn="ctr"/>
+            <a:endParaRPr lang="en-US"/>
+          </a:p>
+        </p:txBody>
+      </p:sp>
+      <p:sp>
+        <p:nvSpPr>
+          <p:cNvPr id="2" name="タイトル 1">
+            <a:extLst>
+              <a:ext uri="{FF2B5EF4-FFF2-40B4-BE49-F238E27FC236}">
+                <a16:creationId xmlns:a16="http://schemas.microsoft.com/office/drawing/2014/main" id="{E933D7A7-69EF-F14A-85DF-21A927D5C250}"/>
+              </a:ext>
+            </a:extLst>
+          </p:cNvPr>
+          <p:cNvSpPr>
+            <a:spLocks noGrp="1"/>
+          </p:cNvSpPr>
+          <p:nvPr>
+            <p:ph type="title"/>
+          </p:nvPr>
+        </p:nvSpPr>
+        <p:spPr>
+          <a:xfrm>
+            <a:off x="621629" y="640080"/>
+            <a:ext cx="4225290" cy="5578816"/>
+          </a:xfrm>
+        </p:spPr>
+        <p:txBody>
+          <a:bodyPr vert="horz" lIns="91440" tIns="45720" rIns="91440" bIns="45720" rtlCol="0" anchor="ctr">
+            <a:normAutofit/>
+          </a:bodyPr>
+          <a:lstStyle/>
+          <a:p>
+            <a:pPr algn="ctr"/>
+            <a:r>
+              <a:rPr kumimoji="1" lang="en-US" altLang="ja-JP" kern="1200">
+                <a:solidFill>
+                  <a:srgbClr val="FFFFFF"/>
+                </a:solidFill>
+                <a:latin typeface="+mj-lt"/>
+                <a:ea typeface="+mj-ea"/>
+                <a:cs typeface="+mj-cs"/>
+              </a:rPr>
+              <a:t>Industry structure of Ube-shi</a:t>
+            </a:r>
+          </a:p>
+        </p:txBody>
+      </p:sp>
+      <p:graphicFrame>
+        <p:nvGraphicFramePr>
+          <p:cNvPr id="5" name="グラフ 4">
+            <a:extLst>
+              <a:ext uri="{FF2B5EF4-FFF2-40B4-BE49-F238E27FC236}">
+                <a16:creationId xmlns:a16="http://schemas.microsoft.com/office/drawing/2014/main" id="{D10EE938-357B-5840-B452-889632D16CCF}"/>
+              </a:ext>
+            </a:extLst>
+          </p:cNvPr>
+          <p:cNvGraphicFramePr>
+            <a:graphicFrameLocks/>
+          </p:cNvGraphicFramePr>
+          <p:nvPr>
+            <p:extLst>
+              <p:ext uri="{D42A27DB-BD31-4B8C-83A1-F6EECF244321}">
+                <p14:modId xmlns:p14="http://schemas.microsoft.com/office/powerpoint/2010/main" val="4053570184"/>
+              </p:ext>
+            </p:extLst>
+          </p:nvPr>
+        </p:nvGraphicFramePr>
+        <p:xfrm>
+          <a:off x="6096000" y="640080"/>
+          <a:ext cx="5459470" cy="5578816"/>
+        </p:xfrm>
+        <a:graphic>
+          <a:graphicData uri="http://schemas.openxmlformats.org/drawingml/2006/chart">
+            <c:chart xmlns:c="http://schemas.openxmlformats.org/drawingml/2006/chart" xmlns:r="http://schemas.openxmlformats.org/officeDocument/2006/relationships" r:id="rId2"/>
+          </a:graphicData>
+        </a:graphic>
+      </p:graphicFrame>
     </p:spTree>
     <p:extLst>
       <p:ext uri="{BB962C8B-B14F-4D97-AF65-F5344CB8AC3E}">
-        <p14:creationId xmlns:p14="http://schemas.microsoft.com/office/powerpoint/2010/main" val="2954630195"/>
+        <p14:creationId xmlns:p14="http://schemas.microsoft.com/office/powerpoint/2010/main" val="1001939709"/>
       </p:ext>
     </p:extLst>
   </p:cSld>

</xml_diff>